<commit_message>
Actualizando la presentacion de PxQ
</commit_message>
<xml_diff>
--- a/Assets/Presentación negocio.pptx
+++ b/Assets/Presentación negocio.pptx
@@ -14,9 +14,9 @@
     <p:sldId id="265" r:id="rId5"/>
     <p:sldId id="264" r:id="rId6"/>
     <p:sldId id="258" r:id="rId7"/>
-    <p:sldId id="266" r:id="rId8"/>
-    <p:sldId id="257" r:id="rId9"/>
-    <p:sldId id="259" r:id="rId10"/>
+    <p:sldId id="257" r:id="rId8"/>
+    <p:sldId id="259" r:id="rId9"/>
+    <p:sldId id="266" r:id="rId10"/>
     <p:sldId id="263" r:id="rId11"/>
     <p:sldId id="260" r:id="rId12"/>
   </p:sldIdLst>
@@ -144,88 +144,88 @@
           <c:idx val="0"/>
           <c:order val="0"/>
           <c:tx>
-            <c:v>Cantidad Usuarios</c:v>
+            <c:v>Ganacia Versión no Paga (USD)</c:v>
           </c:tx>
           <c:marker>
             <c:symbol val="none"/>
           </c:marker>
           <c:val>
             <c:numRef>
-              <c:f>Sheet1!$B$15:$B$38</c:f>
+              <c:f>Sheet1!$C$15:$C$38</c:f>
               <c:numCache>
-                <c:formatCode>General</c:formatCode>
+                <c:formatCode>0</c:formatCode>
                 <c:ptCount val="24"/>
                 <c:pt idx="0">
-                  <c:v>100</c:v>
+                  <c:v>3.6399999999999997</c:v>
                 </c:pt>
                 <c:pt idx="1">
-                  <c:v>150</c:v>
+                  <c:v>18.2</c:v>
                 </c:pt>
                 <c:pt idx="2">
-                  <c:v>500</c:v>
+                  <c:v>36.4</c:v>
                 </c:pt>
                 <c:pt idx="3">
-                  <c:v>1000</c:v>
+                  <c:v>145.6</c:v>
                 </c:pt>
                 <c:pt idx="4">
-                  <c:v>3000</c:v>
+                  <c:v>364</c:v>
                 </c:pt>
                 <c:pt idx="5">
-                  <c:v>15000</c:v>
+                  <c:v>618.79999999999995</c:v>
                 </c:pt>
                 <c:pt idx="6">
-                  <c:v>30000</c:v>
+                  <c:v>1092</c:v>
                 </c:pt>
                 <c:pt idx="7">
-                  <c:v>45000</c:v>
+                  <c:v>1820</c:v>
                 </c:pt>
                 <c:pt idx="8">
-                  <c:v>60000</c:v>
+                  <c:v>2548</c:v>
                 </c:pt>
                 <c:pt idx="9">
-                  <c:v>84000</c:v>
+                  <c:v>3567.2</c:v>
                 </c:pt>
                 <c:pt idx="10">
-                  <c:v>100800</c:v>
+                  <c:v>4280.6399999999994</c:v>
                 </c:pt>
                 <c:pt idx="11">
-                  <c:v>110880.00000000001</c:v>
+                  <c:v>4708.7039999999997</c:v>
                 </c:pt>
                 <c:pt idx="12">
-                  <c:v>111988.80000000002</c:v>
+                  <c:v>4755.7910400000001</c:v>
                 </c:pt>
                 <c:pt idx="13">
-                  <c:v>113108.68800000002</c:v>
+                  <c:v>4803.3489504000008</c:v>
                 </c:pt>
                 <c:pt idx="14">
-                  <c:v>113674.23144000002</c:v>
+                  <c:v>4827.3656951520006</c:v>
                 </c:pt>
                 <c:pt idx="15">
-                  <c:v>118221.20069760003</c:v>
+                  <c:v>5020.4603229580798</c:v>
                 </c:pt>
                 <c:pt idx="16">
-                  <c:v>121767.83671852805</c:v>
+                  <c:v>5171.0741326468233</c:v>
                 </c:pt>
                 <c:pt idx="17">
-                  <c:v>126638.55018726917</c:v>
+                  <c:v>5274.4956152997593</c:v>
                 </c:pt>
                 <c:pt idx="18">
-                  <c:v>132970.47769663265</c:v>
+                  <c:v>5432.7304837587526</c:v>
                 </c:pt>
                 <c:pt idx="19">
-                  <c:v>148168.09798560003</c:v>
+                  <c:v>5337.7175422771188</c:v>
                 </c:pt>
                 <c:pt idx="20">
-                  <c:v>152750.61648</c:v>
+                  <c:v>5560.1224398719996</c:v>
                 </c:pt>
                 <c:pt idx="21">
-                  <c:v>155867.976</c:v>
+                  <c:v>5673.5943263999989</c:v>
                 </c:pt>
                 <c:pt idx="22">
-                  <c:v>158241.60000000001</c:v>
+                  <c:v>5759.99424</c:v>
                 </c:pt>
                 <c:pt idx="23">
-                  <c:v>159840</c:v>
+                  <c:v>5818.1759999999995</c:v>
                 </c:pt>
               </c:numCache>
             </c:numRef>
@@ -236,88 +236,180 @@
           <c:idx val="1"/>
           <c:order val="1"/>
           <c:tx>
-            <c:v>Ganancia</c:v>
+            <c:v>Gancia Versión paga (USD)</c:v>
           </c:tx>
           <c:marker>
             <c:symbol val="none"/>
           </c:marker>
           <c:val>
             <c:numRef>
-              <c:f>Sheet1!$C$15:$C$38</c:f>
+              <c:f>Sheet1!$D$15:$D$38</c:f>
+              <c:numCache>
+                <c:formatCode>0</c:formatCode>
+                <c:ptCount val="24"/>
+                <c:pt idx="0">
+                  <c:v>4</c:v>
+                </c:pt>
+                <c:pt idx="1">
+                  <c:v>61.4</c:v>
+                </c:pt>
+                <c:pt idx="2">
+                  <c:v>92.8</c:v>
+                </c:pt>
+                <c:pt idx="3">
+                  <c:v>471.2</c:v>
+                </c:pt>
+                <c:pt idx="4">
+                  <c:v>928</c:v>
+                </c:pt>
+                <c:pt idx="5">
+                  <c:v>1427.6</c:v>
+                </c:pt>
+                <c:pt idx="6">
+                  <c:v>2584</c:v>
+                </c:pt>
+                <c:pt idx="7">
+                  <c:v>4140</c:v>
+                </c:pt>
+                <c:pt idx="8">
+                  <c:v>4996</c:v>
+                </c:pt>
+                <c:pt idx="9">
+                  <c:v>6994.4</c:v>
+                </c:pt>
+                <c:pt idx="10">
+                  <c:v>6993.28</c:v>
+                </c:pt>
+                <c:pt idx="11">
+                  <c:v>6712.608000000002</c:v>
+                </c:pt>
+                <c:pt idx="12">
+                  <c:v>5721.3340800000005</c:v>
+                </c:pt>
+                <c:pt idx="13">
+                  <c:v>5778.5474208000023</c:v>
+                </c:pt>
+                <c:pt idx="14">
+                  <c:v>5742.1133579039997</c:v>
+                </c:pt>
+                <c:pt idx="15">
+                  <c:v>6433.6583682201599</c:v>
+                </c:pt>
+                <c:pt idx="16">
+                  <c:v>6494.0481825867673</c:v>
+                </c:pt>
+                <c:pt idx="17">
+                  <c:v>6486.0044120913008</c:v>
+                </c:pt>
+                <c:pt idx="18">
+                  <c:v>6822.6470206256563</c:v>
+                </c:pt>
+                <c:pt idx="19">
+                  <c:v>6015.1927654202582</c:v>
+                </c:pt>
+                <c:pt idx="20">
+                  <c:v>7148.7288512640025</c:v>
+                </c:pt>
+                <c:pt idx="21">
+                  <c:v>6982.8853247999987</c:v>
+                </c:pt>
+                <c:pt idx="22">
+                  <c:v>7010.1028800000022</c:v>
+                </c:pt>
+                <c:pt idx="23">
+                  <c:v>7000.9919999999993</c:v>
+                </c:pt>
+              </c:numCache>
+            </c:numRef>
+          </c:val>
+          <c:smooth val="0"/>
+        </c:ser>
+        <c:ser>
+          <c:idx val="2"/>
+          <c:order val="2"/>
+          <c:tx>
+            <c:v>Cantidad Usuarios (cientos)</c:v>
+          </c:tx>
+          <c:marker>
+            <c:symbol val="none"/>
+          </c:marker>
+          <c:val>
+            <c:numRef>
+              <c:f>Sheet1!$E$15:$E$38</c:f>
               <c:numCache>
                 <c:formatCode>General</c:formatCode>
                 <c:ptCount val="24"/>
                 <c:pt idx="0">
-                  <c:v>110.8</c:v>
+                  <c:v>1</c:v>
                 </c:pt>
                 <c:pt idx="1">
-                  <c:v>66.2</c:v>
+                  <c:v>5</c:v>
                 </c:pt>
                 <c:pt idx="2">
-                  <c:v>404</c:v>
+                  <c:v>10</c:v>
                 </c:pt>
                 <c:pt idx="3">
-                  <c:v>608</c:v>
+                  <c:v>40</c:v>
                 </c:pt>
                 <c:pt idx="4">
-                  <c:v>2324</c:v>
+                  <c:v>100</c:v>
                 </c:pt>
                 <c:pt idx="5">
-                  <c:v>13620</c:v>
+                  <c:v>170</c:v>
                 </c:pt>
                 <c:pt idx="6">
-                  <c:v>18240</c:v>
+                  <c:v>300</c:v>
                 </c:pt>
                 <c:pt idx="7">
-                  <c:v>19860</c:v>
+                  <c:v>500</c:v>
                 </c:pt>
                 <c:pt idx="8">
-                  <c:v>21480</c:v>
+                  <c:v>700</c:v>
                 </c:pt>
                 <c:pt idx="9">
-                  <c:v>33072</c:v>
+                  <c:v>980</c:v>
                 </c:pt>
                 <c:pt idx="10">
-                  <c:v>27686.399999999991</c:v>
+                  <c:v>1176</c:v>
                 </c:pt>
                 <c:pt idx="11">
-                  <c:v>22055.040000000023</c:v>
+                  <c:v>1293.6000000000001</c:v>
                 </c:pt>
                 <c:pt idx="12">
-                  <c:v>13203.590400000003</c:v>
+                  <c:v>1306.5360000000003</c:v>
                 </c:pt>
                 <c:pt idx="13">
-                  <c:v>13335.626304000005</c:v>
+                  <c:v>1319.6013600000003</c:v>
                 </c:pt>
                 <c:pt idx="14">
-                  <c:v>12842.360435519993</c:v>
+                  <c:v>1326.1993668000002</c:v>
                 </c:pt>
                 <c:pt idx="15">
-                  <c:v>17314.858932940813</c:v>
+                  <c:v>1379.247341472</c:v>
                 </c:pt>
                 <c:pt idx="16">
-                  <c:v>16697.562386529058</c:v>
+                  <c:v>1420.6247617161603</c:v>
                 </c:pt>
                 <c:pt idx="17">
-                  <c:v>18547.676888966205</c:v>
+                  <c:v>1449.0372569504834</c:v>
                 </c:pt>
                 <c:pt idx="18">
-                  <c:v>20692.739100599774</c:v>
+                  <c:v>1492.508374658998</c:v>
                 </c:pt>
                 <c:pt idx="19">
-                  <c:v>31199.774871412199</c:v>
+                  <c:v>1466.4059182079998</c:v>
                 </c:pt>
                 <c:pt idx="20">
-                  <c:v>21079.585074239996</c:v>
+                  <c:v>1527.5061648000001</c:v>
                 </c:pt>
                 <c:pt idx="21">
-                  <c:v>19951.100927999996</c:v>
+                  <c:v>1558.67976</c:v>
                 </c:pt>
                 <c:pt idx="22">
-                  <c:v>19463.716800000024</c:v>
+                  <c:v>1582.4160000000002</c:v>
                 </c:pt>
                 <c:pt idx="23">
-                  <c:v>18861.119999999988</c:v>
+                  <c:v>1598.4</c:v>
                 </c:pt>
               </c:numCache>
             </c:numRef>
@@ -334,31 +426,20 @@
         </c:dLbls>
         <c:marker val="1"/>
         <c:smooth val="0"/>
-        <c:axId val="31823744"/>
-        <c:axId val="31825280"/>
+        <c:axId val="40943616"/>
+        <c:axId val="72825856"/>
       </c:lineChart>
       <c:catAx>
-        <c:axId val="31823744"/>
+        <c:axId val="40943616"/>
         <c:scaling>
           <c:orientation val="minMax"/>
         </c:scaling>
         <c:delete val="0"/>
         <c:axPos val="b"/>
-        <c:numFmt formatCode="General" sourceLinked="1"/>
         <c:majorTickMark val="out"/>
         <c:minorTickMark val="none"/>
         <c:tickLblPos val="nextTo"/>
-        <c:txPr>
-          <a:bodyPr/>
-          <a:lstStyle/>
-          <a:p>
-            <a:pPr>
-              <a:defRPr lang="es-AR"/>
-            </a:pPr>
-            <a:endParaRPr lang="es-AR"/>
-          </a:p>
-        </c:txPr>
-        <c:crossAx val="31825280"/>
+        <c:crossAx val="72825856"/>
         <c:crosses val="autoZero"/>
         <c:auto val="1"/>
         <c:lblAlgn val="ctr"/>
@@ -366,34 +447,24 @@
         <c:noMultiLvlLbl val="0"/>
       </c:catAx>
       <c:valAx>
-        <c:axId val="31825280"/>
+        <c:axId val="72825856"/>
         <c:scaling>
           <c:orientation val="minMax"/>
         </c:scaling>
         <c:delete val="0"/>
         <c:axPos val="l"/>
         <c:majorGridlines/>
-        <c:numFmt formatCode="General" sourceLinked="1"/>
+        <c:numFmt formatCode="0" sourceLinked="1"/>
         <c:majorTickMark val="out"/>
         <c:minorTickMark val="none"/>
         <c:tickLblPos val="nextTo"/>
-        <c:txPr>
-          <a:bodyPr/>
-          <a:lstStyle/>
-          <a:p>
-            <a:pPr>
-              <a:defRPr lang="es-AR"/>
-            </a:pPr>
-            <a:endParaRPr lang="es-AR"/>
-          </a:p>
-        </c:txPr>
-        <c:crossAx val="31823744"/>
+        <c:crossAx val="40943616"/>
         <c:crosses val="autoZero"/>
         <c:crossBetween val="between"/>
       </c:valAx>
     </c:plotArea>
     <c:legend>
-      <c:legendPos val="r"/>
+      <c:legendPos val="b"/>
       <c:layout/>
       <c:overlay val="0"/>
       <c:txPr>
@@ -401,7 +472,7 @@
         <a:lstStyle/>
         <a:p>
           <a:pPr>
-            <a:defRPr lang="es-AR"/>
+            <a:defRPr sz="1400"/>
           </a:pPr>
           <a:endParaRPr lang="es-AR"/>
         </a:p>
@@ -411,16 +482,6 @@
     <c:dispBlanksAs val="gap"/>
     <c:showDLblsOverMax val="0"/>
   </c:chart>
-  <c:txPr>
-    <a:bodyPr/>
-    <a:lstStyle/>
-    <a:p>
-      <a:pPr>
-        <a:defRPr sz="1800"/>
-      </a:pPr>
-      <a:endParaRPr lang="es-AR"/>
-    </a:p>
-  </c:txPr>
   <c:externalData r:id="rId1">
     <c:autoUpdate val="0"/>
   </c:externalData>
@@ -443,7 +504,17 @@
   <c:chart>
     <c:autoTitleDeleted val="0"/>
     <c:plotArea>
-      <c:layout/>
+      <c:layout>
+        <c:manualLayout>
+          <c:layoutTarget val="inner"/>
+          <c:xMode val="edge"/>
+          <c:yMode val="edge"/>
+          <c:x val="6.8466598949323096E-2"/>
+          <c:y val="2.6108580528089471E-2"/>
+          <c:w val="0.91523035722454738"/>
+          <c:h val="0.81366681479835579"/>
+        </c:manualLayout>
+      </c:layout>
       <c:lineChart>
         <c:grouping val="standard"/>
         <c:varyColors val="0"/>
@@ -452,11 +523,11 @@
           <c:order val="0"/>
           <c:tx>
             <c:strRef>
-              <c:f>Sheet1!$B$14</c:f>
+              <c:f>Sheet2!$C$14</c:f>
               <c:strCache>
                 <c:ptCount val="1"/>
                 <c:pt idx="0">
-                  <c:v>Cantidad Usuarios</c:v>
+                  <c:v>Ganacia sin costo descarga (USD)</c:v>
                 </c:pt>
               </c:strCache>
             </c:strRef>
@@ -464,164 +535,83 @@
           <c:marker>
             <c:symbol val="none"/>
           </c:marker>
-          <c:cat>
-            <c:numRef>
-              <c:f>Sheet1!$A$15:$A$38</c:f>
-              <c:numCache>
-                <c:formatCode>General</c:formatCode>
-                <c:ptCount val="24"/>
-                <c:pt idx="0">
-                  <c:v>1</c:v>
-                </c:pt>
-                <c:pt idx="1">
-                  <c:v>2</c:v>
-                </c:pt>
-                <c:pt idx="2">
-                  <c:v>3</c:v>
-                </c:pt>
-                <c:pt idx="3">
-                  <c:v>4</c:v>
-                </c:pt>
-                <c:pt idx="4">
-                  <c:v>5</c:v>
-                </c:pt>
-                <c:pt idx="5">
-                  <c:v>6</c:v>
-                </c:pt>
-                <c:pt idx="6">
-                  <c:v>7</c:v>
-                </c:pt>
-                <c:pt idx="7">
-                  <c:v>8</c:v>
-                </c:pt>
-                <c:pt idx="8">
-                  <c:v>9</c:v>
-                </c:pt>
-                <c:pt idx="9">
-                  <c:v>10</c:v>
-                </c:pt>
-                <c:pt idx="10">
-                  <c:v>11</c:v>
-                </c:pt>
-                <c:pt idx="11">
-                  <c:v>12</c:v>
-                </c:pt>
-                <c:pt idx="12">
-                  <c:v>13</c:v>
-                </c:pt>
-                <c:pt idx="13">
-                  <c:v>14</c:v>
-                </c:pt>
-                <c:pt idx="14">
-                  <c:v>15</c:v>
-                </c:pt>
-                <c:pt idx="15">
-                  <c:v>16</c:v>
-                </c:pt>
-                <c:pt idx="16">
-                  <c:v>17</c:v>
-                </c:pt>
-                <c:pt idx="17">
-                  <c:v>18</c:v>
-                </c:pt>
-                <c:pt idx="18">
-                  <c:v>19</c:v>
-                </c:pt>
-                <c:pt idx="19">
-                  <c:v>20</c:v>
-                </c:pt>
-                <c:pt idx="20">
-                  <c:v>21</c:v>
-                </c:pt>
-                <c:pt idx="21">
-                  <c:v>22</c:v>
-                </c:pt>
-                <c:pt idx="22">
-                  <c:v>23</c:v>
-                </c:pt>
-                <c:pt idx="23">
-                  <c:v>24</c:v>
-                </c:pt>
-              </c:numCache>
-            </c:numRef>
-          </c:cat>
           <c:val>
             <c:numRef>
-              <c:f>Sheet1!$B$15:$B$38</c:f>
+              <c:f>Sheet2!$C$15:$C$38</c:f>
               <c:numCache>
                 <c:formatCode>0</c:formatCode>
                 <c:ptCount val="24"/>
                 <c:pt idx="0">
-                  <c:v>20000</c:v>
+                  <c:v>728</c:v>
                 </c:pt>
                 <c:pt idx="1">
-                  <c:v>29411.764705882357</c:v>
+                  <c:v>1070.5882352941176</c:v>
                 </c:pt>
                 <c:pt idx="2">
-                  <c:v>44117.647058823532</c:v>
+                  <c:v>1605.8823529411766</c:v>
                 </c:pt>
                 <c:pt idx="3">
-                  <c:v>58823.529411764699</c:v>
+                  <c:v>2141.1764705882351</c:v>
                 </c:pt>
                 <c:pt idx="4">
-                  <c:v>88235.294117647063</c:v>
+                  <c:v>3211.7647058823532</c:v>
                 </c:pt>
                 <c:pt idx="5">
-                  <c:v>111764.70588235294</c:v>
+                  <c:v>4068.2352941176464</c:v>
                 </c:pt>
                 <c:pt idx="6">
-                  <c:v>141176.4705882353</c:v>
+                  <c:v>5138.823529411764</c:v>
                 </c:pt>
                 <c:pt idx="7">
-                  <c:v>176470.5882352941</c:v>
+                  <c:v>6423.5294117647063</c:v>
                 </c:pt>
                 <c:pt idx="8">
-                  <c:v>205882.3529411765</c:v>
+                  <c:v>7494.1176470588225</c:v>
                 </c:pt>
                 <c:pt idx="9">
-                  <c:v>235294.11764705885</c:v>
+                  <c:v>8564.7058823529405</c:v>
                 </c:pt>
                 <c:pt idx="10">
-                  <c:v>500000</c:v>
-                </c:pt>
-                <c:pt idx="11" formatCode="General">
-                  <c:v>750000</c:v>
-                </c:pt>
-                <c:pt idx="12" formatCode="General">
-                  <c:v>1000000</c:v>
-                </c:pt>
-                <c:pt idx="13" formatCode="General">
-                  <c:v>1500000</c:v>
-                </c:pt>
-                <c:pt idx="14" formatCode="General">
-                  <c:v>1900000</c:v>
-                </c:pt>
-                <c:pt idx="15" formatCode="General">
-                  <c:v>2400000</c:v>
-                </c:pt>
-                <c:pt idx="16" formatCode="General">
-                  <c:v>3000000</c:v>
-                </c:pt>
-                <c:pt idx="17" formatCode="General">
-                  <c:v>3500000</c:v>
-                </c:pt>
-                <c:pt idx="18" formatCode="General">
-                  <c:v>4000000</c:v>
-                </c:pt>
-                <c:pt idx="19" formatCode="General">
-                  <c:v>4500000</c:v>
-                </c:pt>
-                <c:pt idx="20" formatCode="General">
-                  <c:v>5250000</c:v>
-                </c:pt>
-                <c:pt idx="21" formatCode="General">
-                  <c:v>6000000</c:v>
-                </c:pt>
-                <c:pt idx="22" formatCode="General">
-                  <c:v>6750000</c:v>
-                </c:pt>
-                <c:pt idx="23" formatCode="General">
-                  <c:v>7500000</c:v>
+                  <c:v>18200</c:v>
+                </c:pt>
+                <c:pt idx="11">
+                  <c:v>27300</c:v>
+                </c:pt>
+                <c:pt idx="12">
+                  <c:v>36400</c:v>
+                </c:pt>
+                <c:pt idx="13">
+                  <c:v>54600</c:v>
+                </c:pt>
+                <c:pt idx="14">
+                  <c:v>69160</c:v>
+                </c:pt>
+                <c:pt idx="15">
+                  <c:v>87360</c:v>
+                </c:pt>
+                <c:pt idx="16">
+                  <c:v>109200</c:v>
+                </c:pt>
+                <c:pt idx="17">
+                  <c:v>127400</c:v>
+                </c:pt>
+                <c:pt idx="18">
+                  <c:v>145600</c:v>
+                </c:pt>
+                <c:pt idx="19">
+                  <c:v>163800</c:v>
+                </c:pt>
+                <c:pt idx="20">
+                  <c:v>191100</c:v>
+                </c:pt>
+                <c:pt idx="21">
+                  <c:v>218400</c:v>
+                </c:pt>
+                <c:pt idx="22">
+                  <c:v>245700</c:v>
+                </c:pt>
+                <c:pt idx="23">
+                  <c:v>273000</c:v>
                 </c:pt>
               </c:numCache>
             </c:numRef>
@@ -633,11 +623,11 @@
           <c:order val="1"/>
           <c:tx>
             <c:strRef>
-              <c:f>Sheet1!$C$14</c:f>
+              <c:f>Sheet2!$D$14</c:f>
               <c:strCache>
                 <c:ptCount val="1"/>
                 <c:pt idx="0">
-                  <c:v>Ganacia</c:v>
+                  <c:v>Ganacia con costo descarga (USD)</c:v>
                 </c:pt>
               </c:strCache>
             </c:strRef>
@@ -645,164 +635,183 @@
           <c:marker>
             <c:symbol val="none"/>
           </c:marker>
-          <c:cat>
+          <c:val>
             <c:numRef>
-              <c:f>Sheet1!$A$15:$A$38</c:f>
+              <c:f>Sheet2!$D$15:$D$38</c:f>
+              <c:numCache>
+                <c:formatCode>0</c:formatCode>
+                <c:ptCount val="24"/>
+                <c:pt idx="0">
+                  <c:v>4200</c:v>
+                </c:pt>
+                <c:pt idx="1">
+                  <c:v>2200</c:v>
+                </c:pt>
+                <c:pt idx="2">
+                  <c:v>3358.8235294117649</c:v>
+                </c:pt>
+                <c:pt idx="3">
+                  <c:v>3988.2352941176468</c:v>
+                </c:pt>
+                <c:pt idx="4">
+                  <c:v>5835.2941176470595</c:v>
+                </c:pt>
+                <c:pt idx="5">
+                  <c:v>7136.4705882352937</c:v>
+                </c:pt>
+                <c:pt idx="6">
+                  <c:v>8983.5294117647063</c:v>
+                </c:pt>
+                <c:pt idx="7">
+                  <c:v>11082.352941176472</c:v>
+                </c:pt>
+                <c:pt idx="8">
+                  <c:v>11752.941176470587</c:v>
+                </c:pt>
+                <c:pt idx="9">
+                  <c:v>13011.764705882353</c:v>
+                </c:pt>
+                <c:pt idx="10">
+                  <c:v>47870.588235294126</c:v>
+                </c:pt>
+                <c:pt idx="11">
+                  <c:v>57100</c:v>
+                </c:pt>
+                <c:pt idx="12">
+                  <c:v>67800</c:v>
+                </c:pt>
+                <c:pt idx="13">
+                  <c:v>114200</c:v>
+                </c:pt>
+                <c:pt idx="14">
+                  <c:v>121320</c:v>
+                </c:pt>
+                <c:pt idx="15">
+                  <c:v>152720</c:v>
+                </c:pt>
+                <c:pt idx="16">
+                  <c:v>188400</c:v>
+                </c:pt>
+                <c:pt idx="17">
+                  <c:v>199800</c:v>
+                </c:pt>
+                <c:pt idx="18">
+                  <c:v>221200</c:v>
+                </c:pt>
+                <c:pt idx="19">
+                  <c:v>242600</c:v>
+                </c:pt>
+                <c:pt idx="20">
+                  <c:v>299700</c:v>
+                </c:pt>
+                <c:pt idx="21">
+                  <c:v>331800</c:v>
+                </c:pt>
+                <c:pt idx="22">
+                  <c:v>363900</c:v>
+                </c:pt>
+                <c:pt idx="23">
+                  <c:v>396000</c:v>
+                </c:pt>
+              </c:numCache>
+            </c:numRef>
+          </c:val>
+          <c:smooth val="0"/>
+        </c:ser>
+        <c:ser>
+          <c:idx val="2"/>
+          <c:order val="2"/>
+          <c:tx>
+            <c:strRef>
+              <c:f>Sheet2!$E$14</c:f>
+              <c:strCache>
+                <c:ptCount val="1"/>
+                <c:pt idx="0">
+                  <c:v>Cantidad Usuarios (cientos)</c:v>
+                </c:pt>
+              </c:strCache>
+            </c:strRef>
+          </c:tx>
+          <c:marker>
+            <c:symbol val="none"/>
+          </c:marker>
+          <c:val>
+            <c:numRef>
+              <c:f>Sheet2!$E$15:$E$38</c:f>
               <c:numCache>
                 <c:formatCode>General</c:formatCode>
                 <c:ptCount val="24"/>
                 <c:pt idx="0">
-                  <c:v>1</c:v>
+                  <c:v>200</c:v>
                 </c:pt>
                 <c:pt idx="1">
-                  <c:v>2</c:v>
+                  <c:v>294.11764705882354</c:v>
                 </c:pt>
                 <c:pt idx="2">
-                  <c:v>3</c:v>
+                  <c:v>441.1764705882353</c:v>
                 </c:pt>
                 <c:pt idx="3">
-                  <c:v>4</c:v>
+                  <c:v>588.23529411764707</c:v>
                 </c:pt>
                 <c:pt idx="4">
-                  <c:v>5</c:v>
+                  <c:v>882.35294117647061</c:v>
                 </c:pt>
                 <c:pt idx="5">
-                  <c:v>6</c:v>
+                  <c:v>1117.6470588235293</c:v>
                 </c:pt>
                 <c:pt idx="6">
-                  <c:v>7</c:v>
+                  <c:v>1411.7647058823529</c:v>
                 </c:pt>
                 <c:pt idx="7">
-                  <c:v>8</c:v>
+                  <c:v>1764.7058823529412</c:v>
                 </c:pt>
                 <c:pt idx="8">
-                  <c:v>9</c:v>
+                  <c:v>2058.8235294117649</c:v>
                 </c:pt>
                 <c:pt idx="9">
-                  <c:v>10</c:v>
+                  <c:v>2352.9411764705883</c:v>
                 </c:pt>
                 <c:pt idx="10">
-                  <c:v>11</c:v>
+                  <c:v>5000</c:v>
                 </c:pt>
                 <c:pt idx="11">
-                  <c:v>12</c:v>
+                  <c:v>7500</c:v>
                 </c:pt>
                 <c:pt idx="12">
-                  <c:v>13</c:v>
+                  <c:v>10000</c:v>
                 </c:pt>
                 <c:pt idx="13">
-                  <c:v>14</c:v>
+                  <c:v>15000</c:v>
                 </c:pt>
                 <c:pt idx="14">
-                  <c:v>15</c:v>
+                  <c:v>19000</c:v>
                 </c:pt>
                 <c:pt idx="15">
-                  <c:v>16</c:v>
+                  <c:v>24000</c:v>
                 </c:pt>
                 <c:pt idx="16">
-                  <c:v>17</c:v>
+                  <c:v>30000</c:v>
                 </c:pt>
                 <c:pt idx="17">
-                  <c:v>18</c:v>
+                  <c:v>35000</c:v>
                 </c:pt>
                 <c:pt idx="18">
-                  <c:v>19</c:v>
+                  <c:v>40000</c:v>
                 </c:pt>
                 <c:pt idx="19">
-                  <c:v>20</c:v>
+                  <c:v>45000</c:v>
                 </c:pt>
                 <c:pt idx="20">
-                  <c:v>21</c:v>
+                  <c:v>52500</c:v>
                 </c:pt>
                 <c:pt idx="21">
-                  <c:v>22</c:v>
+                  <c:v>60000</c:v>
                 </c:pt>
                 <c:pt idx="22">
-                  <c:v>23</c:v>
+                  <c:v>67500</c:v>
                 </c:pt>
                 <c:pt idx="23">
-                  <c:v>24</c:v>
-                </c:pt>
-              </c:numCache>
-            </c:numRef>
-          </c:cat>
-          <c:val>
-            <c:numRef>
-              <c:f>Sheet1!$C$15:$C$38</c:f>
-              <c:numCache>
-                <c:formatCode>0</c:formatCode>
-                <c:ptCount val="24"/>
-                <c:pt idx="0">
-                  <c:v>22160</c:v>
-                </c:pt>
-                <c:pt idx="1">
-                  <c:v>12588.235294117649</c:v>
-                </c:pt>
-                <c:pt idx="2">
-                  <c:v>19470.588235294126</c:v>
-                </c:pt>
-                <c:pt idx="3">
-                  <c:v>21058.823529411758</c:v>
-                </c:pt>
-                <c:pt idx="4">
-                  <c:v>38941.176470588238</c:v>
-                </c:pt>
-                <c:pt idx="5">
-                  <c:v>35599.999999999993</c:v>
-                </c:pt>
-                <c:pt idx="6">
-                  <c:v>44658.823529411784</c:v>
-                </c:pt>
-                <c:pt idx="7">
-                  <c:v>54352.941176470602</c:v>
-                </c:pt>
-                <c:pt idx="8">
-                  <c:v>51647.058823529434</c:v>
-                </c:pt>
-                <c:pt idx="9">
-                  <c:v>54823.529411764684</c:v>
-                </c:pt>
-                <c:pt idx="10">
-                  <c:v>318705.88235294115</c:v>
-                </c:pt>
-                <c:pt idx="11" formatCode="General">
-                  <c:v>331000</c:v>
-                </c:pt>
-                <c:pt idx="12" formatCode="General">
-                  <c:v>358000</c:v>
-                </c:pt>
-                <c:pt idx="13" formatCode="General">
-                  <c:v>662000</c:v>
-                </c:pt>
-                <c:pt idx="14" formatCode="General">
-                  <c:v>605200</c:v>
-                </c:pt>
-                <c:pt idx="15" formatCode="General">
-                  <c:v>759200</c:v>
-                </c:pt>
-                <c:pt idx="16" formatCode="General">
-                  <c:v>924000</c:v>
-                </c:pt>
-                <c:pt idx="17" formatCode="General">
-                  <c:v>878000</c:v>
-                </c:pt>
-                <c:pt idx="18" formatCode="General">
-                  <c:v>932000</c:v>
-                </c:pt>
-                <c:pt idx="19" formatCode="General">
-                  <c:v>986000</c:v>
-                </c:pt>
-                <c:pt idx="20" formatCode="General">
-                  <c:v>1317000</c:v>
-                </c:pt>
-                <c:pt idx="21" formatCode="General">
-                  <c:v>1398000</c:v>
-                </c:pt>
-                <c:pt idx="22" formatCode="General">
-                  <c:v>1479000</c:v>
-                </c:pt>
-                <c:pt idx="23" formatCode="General">
-                  <c:v>1560000</c:v>
+                  <c:v>75000</c:v>
                 </c:pt>
               </c:numCache>
             </c:numRef>
@@ -819,31 +828,20 @@
         </c:dLbls>
         <c:marker val="1"/>
         <c:smooth val="0"/>
-        <c:axId val="34148736"/>
-        <c:axId val="34150272"/>
+        <c:axId val="36282752"/>
+        <c:axId val="36284672"/>
       </c:lineChart>
       <c:catAx>
-        <c:axId val="34148736"/>
+        <c:axId val="36282752"/>
         <c:scaling>
           <c:orientation val="minMax"/>
         </c:scaling>
         <c:delete val="0"/>
         <c:axPos val="b"/>
-        <c:numFmt formatCode="General" sourceLinked="1"/>
         <c:majorTickMark val="out"/>
         <c:minorTickMark val="none"/>
         <c:tickLblPos val="nextTo"/>
-        <c:txPr>
-          <a:bodyPr/>
-          <a:lstStyle/>
-          <a:p>
-            <a:pPr>
-              <a:defRPr lang="es-AR"/>
-            </a:pPr>
-            <a:endParaRPr lang="es-AR"/>
-          </a:p>
-        </c:txPr>
-        <c:crossAx val="34150272"/>
+        <c:crossAx val="36284672"/>
         <c:crosses val="autoZero"/>
         <c:auto val="1"/>
         <c:lblAlgn val="ctr"/>
@@ -851,7 +849,7 @@
         <c:noMultiLvlLbl val="0"/>
       </c:catAx>
       <c:valAx>
-        <c:axId val="34150272"/>
+        <c:axId val="36284672"/>
         <c:scaling>
           <c:orientation val="minMax"/>
         </c:scaling>
@@ -862,31 +860,30 @@
         <c:majorTickMark val="out"/>
         <c:minorTickMark val="none"/>
         <c:tickLblPos val="nextTo"/>
-        <c:txPr>
-          <a:bodyPr/>
-          <a:lstStyle/>
-          <a:p>
-            <a:pPr>
-              <a:defRPr lang="es-AR"/>
-            </a:pPr>
-            <a:endParaRPr lang="es-AR"/>
-          </a:p>
-        </c:txPr>
-        <c:crossAx val="34148736"/>
+        <c:crossAx val="36282752"/>
         <c:crosses val="autoZero"/>
         <c:crossBetween val="between"/>
       </c:valAx>
     </c:plotArea>
     <c:legend>
-      <c:legendPos val="r"/>
-      <c:layout/>
+      <c:legendPos val="b"/>
+      <c:layout>
+        <c:manualLayout>
+          <c:xMode val="edge"/>
+          <c:yMode val="edge"/>
+          <c:x val="3.1027131439177159E-2"/>
+          <c:y val="0.86440728807910228"/>
+          <c:w val="0.93239020122484695"/>
+          <c:h val="0.13133077806169685"/>
+        </c:manualLayout>
+      </c:layout>
       <c:overlay val="0"/>
       <c:txPr>
         <a:bodyPr/>
         <a:lstStyle/>
         <a:p>
           <a:pPr>
-            <a:defRPr lang="es-AR"/>
+            <a:defRPr sz="1400"/>
           </a:pPr>
           <a:endParaRPr lang="es-AR"/>
         </a:p>
@@ -896,16 +893,6 @@
     <c:dispBlanksAs val="gap"/>
     <c:showDLblsOverMax val="0"/>
   </c:chart>
-  <c:txPr>
-    <a:bodyPr/>
-    <a:lstStyle/>
-    <a:p>
-      <a:pPr>
-        <a:defRPr sz="1800"/>
-      </a:pPr>
-      <a:endParaRPr lang="es-AR"/>
-    </a:p>
-  </c:txPr>
   <c:externalData r:id="rId1">
     <c:autoUpdate val="0"/>
   </c:externalData>
@@ -3928,13 +3915,8 @@
             </a:r>
             <a:r>
               <a:rPr lang="es-AR" baseline="0" dirty="0" smtClean="0"/>
-              <a:t> pensando “esto muy lindo, realmente me gustaría tener esta aplicación, pero realmente voy a ganar dinero con ella?”. Pues sí señores. Hemos analizado distintos escenarios basados en casos reales y a modo de ejemplo les mostraremos dos de </a:t>
-            </a:r>
-            <a:r>
-              <a:rPr lang="es-AR" baseline="0" dirty="0" smtClean="0"/>
-              <a:t>ellos.</a:t>
-            </a:r>
-            <a:endParaRPr lang="es-AR" baseline="0" dirty="0" smtClean="0"/>
+              <a:t> pensando “esto muy lindo, realmente me gustaría tener esta aplicación, pero realmente voy a ganar dinero con ella?”. Pues sí señores. Hemos analizado distintos escenarios basados en casos reales y a modo de ejemplo les mostraremos dos de ellos</a:t>
+            </a:r>
           </a:p>
         </p:txBody>
       </p:sp>
@@ -4019,7 +4001,208 @@
           <a:bodyPr/>
           <a:lstStyle/>
           <a:p>
-            <a:endParaRPr lang="es-AR" dirty="0"/>
+            <a:r>
+              <a:rPr lang="es-AR" dirty="0" smtClean="0"/>
+              <a:t>En primer lugar, mostraremos el peor caso,</a:t>
+            </a:r>
+            <a:r>
+              <a:rPr lang="es-AR" baseline="0" dirty="0" smtClean="0"/>
+              <a:t> en el que el producto no se expanda fuera del país y que luego de 2 años se estanque en un 3% del mercado nacional. En ese caso, hemos considerado solo el mercado de </a:t>
+            </a:r>
+            <a:r>
+              <a:rPr lang="es-AR" baseline="0" dirty="0" err="1" smtClean="0"/>
+              <a:t>android</a:t>
+            </a:r>
+            <a:r>
+              <a:rPr lang="es-AR" baseline="0" dirty="0" smtClean="0"/>
+              <a:t> y hemos tomado como patrón de crecimiento estadísticas de otras empresas conocidas. </a:t>
+            </a:r>
+            <a:endParaRPr lang="es-AR" baseline="0" dirty="0" smtClean="0"/>
+          </a:p>
+          <a:p>
+            <a:r>
+              <a:rPr lang="es-AR" baseline="0" dirty="0" smtClean="0"/>
+              <a:t>Hemos generado dos escenarios posibles: uno que permite a los usuarios tener una versión paga (y sin publicidad) y otro sin esta opción. </a:t>
+            </a:r>
+            <a:r>
+              <a:rPr lang="es-AR" baseline="0" dirty="0" err="1" smtClean="0"/>
+              <a:t>Pára</a:t>
+            </a:r>
+            <a:r>
+              <a:rPr lang="es-AR" baseline="0" dirty="0" smtClean="0"/>
+              <a:t> calcular en el primer caso cuantos usuarios optarían por una versión paga, nos basamos en encuestas que nos devolvieron que el 10% de los usuarios </a:t>
+            </a:r>
+            <a:r>
+              <a:rPr lang="es-AR" baseline="0" dirty="0" err="1" smtClean="0"/>
+              <a:t>eligirían</a:t>
+            </a:r>
+            <a:r>
+              <a:rPr lang="es-AR" baseline="0" dirty="0" smtClean="0"/>
+              <a:t> esta </a:t>
+            </a:r>
+            <a:r>
+              <a:rPr lang="es-AR" baseline="0" dirty="0" err="1" smtClean="0"/>
+              <a:t>opcion</a:t>
+            </a:r>
+            <a:r>
+              <a:rPr lang="es-AR" baseline="0" dirty="0" smtClean="0"/>
+              <a:t>.</a:t>
+            </a:r>
+          </a:p>
+          <a:p>
+            <a:r>
+              <a:rPr lang="es-AR" baseline="0" dirty="0" smtClean="0"/>
+              <a:t>Para </a:t>
+            </a:r>
+            <a:r>
+              <a:rPr lang="es-AR" baseline="0" dirty="0" smtClean="0"/>
+              <a:t>las ganancias se ha tenido en cuenta la descarga de aplicación a 1 </a:t>
+            </a:r>
+            <a:r>
+              <a:rPr lang="es-AR" baseline="0" dirty="0" smtClean="0"/>
+              <a:t>dólar (para la versión paga) </a:t>
+            </a:r>
+            <a:r>
+              <a:rPr lang="es-AR" baseline="0" dirty="0" smtClean="0"/>
+              <a:t>y las ganancias por </a:t>
+            </a:r>
+            <a:r>
+              <a:rPr lang="es-AR" baseline="0" dirty="0" err="1" smtClean="0"/>
+              <a:t>google</a:t>
+            </a:r>
+            <a:r>
+              <a:rPr lang="es-AR" baseline="0" dirty="0" smtClean="0"/>
+              <a:t> </a:t>
+            </a:r>
+            <a:r>
+              <a:rPr lang="es-AR" baseline="0" dirty="0" err="1" smtClean="0"/>
+              <a:t>Adds</a:t>
+            </a:r>
+            <a:r>
+              <a:rPr lang="es-AR" baseline="0" dirty="0" smtClean="0"/>
+              <a:t> en base a la cantidad de vistas y </a:t>
+            </a:r>
+            <a:r>
+              <a:rPr lang="es-AR" baseline="0" dirty="0" err="1" smtClean="0"/>
+              <a:t>clicks</a:t>
+            </a:r>
+            <a:r>
+              <a:rPr lang="es-AR" baseline="0" dirty="0" smtClean="0"/>
+              <a:t>. Para esto último se ha considerado los valores más bajos del mercado, es decir, tan solo </a:t>
+            </a:r>
+            <a:r>
+              <a:rPr lang="es-AR" baseline="0" dirty="0" smtClean="0"/>
+              <a:t>15 (15-30)  </a:t>
+            </a:r>
+            <a:r>
+              <a:rPr lang="es-AR" baseline="0" dirty="0" smtClean="0"/>
+              <a:t>centavos por </a:t>
+            </a:r>
+            <a:r>
+              <a:rPr lang="es-AR" baseline="0" dirty="0" err="1" smtClean="0"/>
+              <a:t>clicks</a:t>
+            </a:r>
+            <a:r>
+              <a:rPr lang="es-AR" baseline="0" dirty="0" smtClean="0"/>
+              <a:t>, una probabilidad de </a:t>
+            </a:r>
+            <a:r>
+              <a:rPr lang="es-AR" baseline="0" dirty="0" err="1" smtClean="0"/>
+              <a:t>click</a:t>
+            </a:r>
+            <a:r>
+              <a:rPr lang="es-AR" baseline="0" dirty="0" smtClean="0"/>
+              <a:t> de 1,5% (1,5%-2,5%)  </a:t>
+            </a:r>
+            <a:r>
+              <a:rPr lang="es-AR" baseline="0" dirty="0" smtClean="0"/>
+              <a:t>y </a:t>
+            </a:r>
+            <a:r>
+              <a:rPr lang="es-AR" baseline="0" dirty="0" smtClean="0"/>
+              <a:t>10 </a:t>
+            </a:r>
+            <a:r>
+              <a:rPr lang="es-AR" baseline="0" dirty="0" smtClean="0"/>
+              <a:t>centavo </a:t>
+            </a:r>
+            <a:r>
+              <a:rPr lang="es-AR" baseline="0" dirty="0" smtClean="0"/>
+              <a:t>por cada mil vistas.</a:t>
+            </a:r>
+            <a:endParaRPr lang="es-AR" baseline="0" dirty="0" smtClean="0"/>
+          </a:p>
+          <a:p>
+            <a:r>
+              <a:rPr lang="es-AR" baseline="0" dirty="0" smtClean="0"/>
+              <a:t>En este gráfico se puede ver como la aplicación crecería </a:t>
+            </a:r>
+            <a:r>
+              <a:rPr lang="es-AR" baseline="0" dirty="0" smtClean="0"/>
+              <a:t>fuertemente hasta el mes 11, </a:t>
+            </a:r>
+            <a:r>
+              <a:rPr lang="es-AR" baseline="0" dirty="0" smtClean="0"/>
+              <a:t>llegando a los 100mil usuarios y finalmente iría disminuyendo su crecimiento a partir de ahí hasta estancarse en 160mil usuarios. </a:t>
+            </a:r>
+            <a:endParaRPr lang="es-AR" baseline="0" dirty="0" smtClean="0"/>
+          </a:p>
+          <a:p>
+            <a:r>
+              <a:rPr lang="es-AR" baseline="0" dirty="0" smtClean="0"/>
+              <a:t>En lo referente a las ganancias, las mismas acompañan el crecimiento de la cantidad de usuarios, teniendo en el caso de la versión paga un crecimiento mas pronunciado mientras la aplicación este en plena expansión (casi 7k </a:t>
+            </a:r>
+            <a:r>
+              <a:rPr lang="es-AR" baseline="0" dirty="0" err="1" smtClean="0"/>
+              <a:t>dolares</a:t>
+            </a:r>
+            <a:r>
+              <a:rPr lang="es-AR" baseline="0" dirty="0" smtClean="0"/>
+              <a:t>). Finalmente ambos escenarios se estabilizarían luego de dos años entre 5800 y 7000</a:t>
+            </a:r>
+          </a:p>
+          <a:p>
+            <a:r>
+              <a:rPr lang="es-AR" baseline="0" dirty="0" smtClean="0"/>
+              <a:t>Teniendo </a:t>
+            </a:r>
+            <a:r>
+              <a:rPr lang="es-AR" baseline="0" dirty="0" smtClean="0"/>
+              <a:t>en cuenta que el gasto para mantener la aplicación son casi mínimos (tan solo un servidor) , casi todo sería ganancias.</a:t>
+            </a:r>
+          </a:p>
+          <a:p>
+            <a:r>
+              <a:rPr lang="es-AR" baseline="0" dirty="0" smtClean="0"/>
+              <a:t>Finalmente se puede concluir, que siendo este el peor escenario posible, teniendo en cuenta los precios mas bajos del mercado en lo referente a publicidad, sin considerar la </a:t>
+            </a:r>
+            <a:r>
+              <a:rPr lang="es-AR" baseline="0" dirty="0" err="1" smtClean="0"/>
+              <a:t>expansion</a:t>
+            </a:r>
+            <a:r>
+              <a:rPr lang="es-AR" baseline="0" dirty="0" smtClean="0"/>
+              <a:t> del mercado de </a:t>
+            </a:r>
+            <a:r>
+              <a:rPr lang="es-AR" baseline="0" dirty="0" err="1" smtClean="0"/>
+              <a:t>smartphones</a:t>
+            </a:r>
+            <a:r>
+              <a:rPr lang="es-AR" baseline="0" dirty="0" smtClean="0"/>
+              <a:t> en un futuro y considerando tan solo una expansión del 3%, </a:t>
+            </a:r>
+            <a:r>
+              <a:rPr lang="es-AR" baseline="0" dirty="0" smtClean="0"/>
+              <a:t>el negocio no daría perdidas y hasta estaría brindando un margen de ganancias.</a:t>
+            </a:r>
+            <a:endParaRPr lang="es-AR" baseline="0" dirty="0" smtClean="0"/>
+          </a:p>
+          <a:p>
+            <a:r>
+              <a:rPr lang="es-AR" baseline="0" dirty="0" smtClean="0"/>
+              <a:t>Sin embargo, ahora nos podríamos preguntar, y si la aplicación es realmente un éxito y se expande a otros mercados con una captación mayor?</a:t>
+            </a:r>
           </a:p>
         </p:txBody>
       </p:sp>
@@ -4050,7 +4233,7 @@
     </p:spTree>
     <p:extLst>
       <p:ext uri="{BB962C8B-B14F-4D97-AF65-F5344CB8AC3E}">
-        <p14:creationId xmlns:p14="http://schemas.microsoft.com/office/powerpoint/2010/main" val="1057133531"/>
+        <p14:creationId xmlns:p14="http://schemas.microsoft.com/office/powerpoint/2010/main" val="3003342862"/>
       </p:ext>
     </p:extLst>
   </p:cSld>
@@ -4106,124 +4289,572 @@
           <a:p>
             <a:r>
               <a:rPr lang="es-AR" dirty="0" smtClean="0"/>
-              <a:t>En primer lugar, mostraremos el peor caso,</a:t>
-            </a:r>
-            <a:r>
-              <a:rPr lang="es-AR" baseline="0" dirty="0" smtClean="0"/>
-              <a:t> en el que el producto no se expanda fuera del país y que luego de 2 años se estanque en un 3% del mercado nacional. En ese caso, hemos considerado solo el mercado de </a:t>
+              <a:t>En ese escenario, hemos tomado los datos de una empresa</a:t>
+            </a:r>
+            <a:r>
+              <a:rPr lang="es-AR" baseline="0" dirty="0" smtClean="0"/>
+              <a:t> similar (como </a:t>
             </a:r>
             <a:r>
               <a:rPr lang="es-AR" baseline="0" dirty="0" err="1" smtClean="0"/>
-              <a:t>android</a:t>
-            </a:r>
-            <a:r>
-              <a:rPr lang="es-AR" baseline="0" dirty="0" smtClean="0"/>
-              <a:t> y hemos tomado como patrón de crecimiento estadísticas de otras empresas conocidas. Para las ganancias se ha tenido en cuenta la descarga de aplicación a 1 dólar y las ganancias por </a:t>
-            </a:r>
-            <a:r>
-              <a:rPr lang="es-AR" baseline="0" dirty="0" err="1" smtClean="0"/>
-              <a:t>google</a:t>
-            </a:r>
-            <a:r>
-              <a:rPr lang="es-AR" baseline="0" dirty="0" smtClean="0"/>
+              <a:t>Foursqare</a:t>
+            </a:r>
+            <a:r>
+              <a:rPr lang="es-AR" baseline="0" dirty="0" smtClean="0"/>
+              <a:t>) y su crecimiento en sus dos primeros años. Para quienes no conozcan esta compañía, la misma </a:t>
+            </a:r>
+            <a:r>
+              <a:rPr lang="es-AR" sz="1200" b="0" i="0" kern="1200" dirty="0" smtClean="0">
+                <a:solidFill>
+                  <a:schemeClr val="tx1"/>
+                </a:solidFill>
+                <a:effectLst/>
+                <a:latin typeface="+mn-lt"/>
+                <a:ea typeface="+mn-ea"/>
+                <a:cs typeface="+mn-cs"/>
+              </a:rPr>
+              <a:t>es un </a:t>
+            </a:r>
+            <a:r>
+              <a:rPr lang="es-AR" sz="1200" b="0" i="0" u="none" strike="noStrike" kern="1200" dirty="0" smtClean="0">
+                <a:solidFill>
+                  <a:schemeClr val="tx1"/>
+                </a:solidFill>
+                <a:effectLst/>
+                <a:latin typeface="+mn-lt"/>
+                <a:ea typeface="+mn-ea"/>
+                <a:cs typeface="+mn-cs"/>
+                <a:hlinkClick r:id="rId3" tooltip="Servicio basado en localización"/>
+              </a:rPr>
+              <a:t>servicio basado en localización</a:t>
+            </a:r>
+            <a:r>
+              <a:rPr lang="es-AR" sz="1200" b="0" i="0" kern="1200" dirty="0" smtClean="0">
+                <a:solidFill>
+                  <a:schemeClr val="tx1"/>
+                </a:solidFill>
+                <a:effectLst/>
+                <a:latin typeface="+mn-lt"/>
+                <a:ea typeface="+mn-ea"/>
+                <a:cs typeface="+mn-cs"/>
+              </a:rPr>
+              <a:t> web aplicada a las </a:t>
+            </a:r>
+            <a:r>
+              <a:rPr lang="es-AR" sz="1200" b="0" i="0" u="none" strike="noStrike" kern="1200" dirty="0" smtClean="0">
+                <a:solidFill>
+                  <a:schemeClr val="tx1"/>
+                </a:solidFill>
+                <a:effectLst/>
+                <a:latin typeface="+mn-lt"/>
+                <a:ea typeface="+mn-ea"/>
+                <a:cs typeface="+mn-cs"/>
+                <a:hlinkClick r:id="rId4" tooltip="Redes sociales"/>
+              </a:rPr>
+              <a:t>redes sociales</a:t>
+            </a:r>
+            <a:r>
+              <a:rPr lang="es-AR" sz="1200" b="0" i="0" kern="1200" dirty="0" smtClean="0">
+                <a:solidFill>
+                  <a:schemeClr val="tx1"/>
+                </a:solidFill>
+                <a:effectLst/>
+                <a:latin typeface="+mn-lt"/>
+                <a:ea typeface="+mn-ea"/>
+                <a:cs typeface="+mn-cs"/>
+              </a:rPr>
+              <a:t>. La </a:t>
+            </a:r>
+            <a:r>
+              <a:rPr lang="es-AR" sz="1200" b="0" i="0" kern="1200" dirty="0" err="1" smtClean="0">
+                <a:solidFill>
+                  <a:schemeClr val="tx1"/>
+                </a:solidFill>
+                <a:effectLst/>
+                <a:latin typeface="+mn-lt"/>
+                <a:ea typeface="+mn-ea"/>
+                <a:cs typeface="+mn-cs"/>
+              </a:rPr>
+              <a:t>geolocalización</a:t>
+            </a:r>
+            <a:r>
+              <a:rPr lang="es-AR" sz="1200" b="0" i="0" kern="1200" dirty="0" smtClean="0">
+                <a:solidFill>
+                  <a:schemeClr val="tx1"/>
+                </a:solidFill>
+                <a:effectLst/>
+                <a:latin typeface="+mn-lt"/>
+                <a:ea typeface="+mn-ea"/>
+                <a:cs typeface="+mn-cs"/>
+              </a:rPr>
+              <a:t> permite localizar un dispositivo fijo o móvil en una ubicación geográfica.</a:t>
+            </a:r>
+            <a:r>
+              <a:rPr lang="es-AR" sz="1200" b="0" i="0" kern="1200" baseline="0" dirty="0" smtClean="0">
+                <a:solidFill>
+                  <a:schemeClr val="tx1"/>
+                </a:solidFill>
+                <a:effectLst/>
+                <a:latin typeface="+mn-lt"/>
+                <a:ea typeface="+mn-ea"/>
+                <a:cs typeface="+mn-cs"/>
+              </a:rPr>
+              <a:t> Si bien es una aplicación exitosa, no es considerada como una aplicación especialmente </a:t>
+            </a:r>
+            <a:r>
+              <a:rPr lang="es-AR" sz="1200" b="0" i="0" kern="1200" baseline="0" dirty="0" err="1" smtClean="0">
+                <a:solidFill>
+                  <a:schemeClr val="tx1"/>
+                </a:solidFill>
+                <a:effectLst/>
+                <a:latin typeface="+mn-lt"/>
+                <a:ea typeface="+mn-ea"/>
+                <a:cs typeface="+mn-cs"/>
+              </a:rPr>
+              <a:t>virosica</a:t>
+            </a:r>
+            <a:r>
+              <a:rPr lang="es-AR" sz="1200" b="0" i="0" kern="1200" baseline="0" dirty="0" smtClean="0">
+                <a:solidFill>
+                  <a:schemeClr val="tx1"/>
+                </a:solidFill>
+                <a:effectLst/>
+                <a:latin typeface="+mn-lt"/>
+                <a:ea typeface="+mn-ea"/>
+                <a:cs typeface="+mn-cs"/>
+              </a:rPr>
+              <a:t> ni con un extremo furor. La misma alcanzo a los 2 años de su lanzamiento 8 millones de usuarios. </a:t>
+            </a:r>
+            <a:endParaRPr lang="es-AR" sz="1200" b="0" i="0" kern="1200" baseline="0" dirty="0" smtClean="0">
+              <a:solidFill>
+                <a:schemeClr val="tx1"/>
+              </a:solidFill>
+              <a:effectLst/>
+              <a:latin typeface="+mn-lt"/>
+              <a:ea typeface="+mn-ea"/>
+              <a:cs typeface="+mn-cs"/>
+            </a:endParaRPr>
+          </a:p>
+          <a:p>
+            <a:r>
+              <a:rPr lang="es-AR" sz="1200" b="0" i="0" kern="1200" baseline="0" dirty="0" smtClean="0">
+                <a:solidFill>
+                  <a:schemeClr val="tx1"/>
+                </a:solidFill>
+                <a:effectLst/>
+                <a:latin typeface="+mn-lt"/>
+                <a:ea typeface="+mn-ea"/>
+                <a:cs typeface="+mn-cs"/>
+              </a:rPr>
+              <a:t>Lo </a:t>
+            </a:r>
+            <a:r>
+              <a:rPr lang="es-AR" sz="1200" b="0" i="0" kern="1200" baseline="0" dirty="0" smtClean="0">
+                <a:solidFill>
+                  <a:schemeClr val="tx1"/>
+                </a:solidFill>
+                <a:effectLst/>
+                <a:latin typeface="+mn-lt"/>
+                <a:ea typeface="+mn-ea"/>
+                <a:cs typeface="+mn-cs"/>
+              </a:rPr>
+              <a:t>consiguió al expandirse </a:t>
+            </a:r>
+            <a:r>
+              <a:rPr lang="es-AR" sz="1200" b="0" i="0" kern="1200" baseline="0" dirty="0" smtClean="0">
+                <a:solidFill>
+                  <a:schemeClr val="tx1"/>
+                </a:solidFill>
+                <a:effectLst/>
+                <a:latin typeface="+mn-lt"/>
+                <a:ea typeface="+mn-ea"/>
+                <a:cs typeface="+mn-cs"/>
+              </a:rPr>
+              <a:t>en varias plataformas (a los 3 meses de su lanzamiento) así como en </a:t>
+            </a:r>
+            <a:r>
+              <a:rPr lang="es-AR" sz="1200" b="0" i="0" kern="1200" baseline="0" dirty="0" smtClean="0">
+                <a:solidFill>
+                  <a:schemeClr val="tx1"/>
+                </a:solidFill>
+                <a:effectLst/>
+                <a:latin typeface="+mn-lt"/>
+                <a:ea typeface="+mn-ea"/>
+                <a:cs typeface="+mn-cs"/>
+              </a:rPr>
+              <a:t>varias regiones (su </a:t>
+            </a:r>
+            <a:r>
+              <a:rPr lang="es-AR" sz="1200" b="0" i="0" kern="1200" baseline="0" dirty="0" err="1" smtClean="0">
+                <a:solidFill>
+                  <a:schemeClr val="tx1"/>
+                </a:solidFill>
+                <a:effectLst/>
+                <a:latin typeface="+mn-lt"/>
+                <a:ea typeface="+mn-ea"/>
+                <a:cs typeface="+mn-cs"/>
+              </a:rPr>
+              <a:t>aplicaciónes</a:t>
+            </a:r>
+            <a:r>
+              <a:rPr lang="es-AR" sz="1200" b="0" i="0" kern="1200" baseline="0" dirty="0" smtClean="0">
+                <a:solidFill>
+                  <a:schemeClr val="tx1"/>
+                </a:solidFill>
+                <a:effectLst/>
+                <a:latin typeface="+mn-lt"/>
+                <a:ea typeface="+mn-ea"/>
+                <a:cs typeface="+mn-cs"/>
+              </a:rPr>
               <a:t> </a:t>
             </a:r>
             <a:r>
-              <a:rPr lang="es-AR" baseline="0" dirty="0" err="1" smtClean="0"/>
-              <a:t>Adds</a:t>
-            </a:r>
-            <a:r>
-              <a:rPr lang="es-AR" baseline="0" dirty="0" smtClean="0"/>
-              <a:t> en base a la cantidad de vistas y </a:t>
-            </a:r>
-            <a:r>
-              <a:rPr lang="es-AR" baseline="0" dirty="0" err="1" smtClean="0"/>
-              <a:t>clicks</a:t>
-            </a:r>
-            <a:r>
-              <a:rPr lang="es-AR" baseline="0" dirty="0" smtClean="0"/>
-              <a:t>. Para esto último se ha considerado los valores más bajos del mercado, es decir, tan solo 10 centavos por </a:t>
-            </a:r>
-            <a:r>
-              <a:rPr lang="es-AR" baseline="0" dirty="0" err="1" smtClean="0"/>
-              <a:t>clicks</a:t>
-            </a:r>
-            <a:r>
-              <a:rPr lang="es-AR" baseline="0" dirty="0" smtClean="0"/>
-              <a:t> y 0,1 centavo por vista.</a:t>
-            </a:r>
-          </a:p>
-          <a:p>
-            <a:r>
-              <a:rPr lang="es-AR" baseline="0" dirty="0" smtClean="0"/>
-              <a:t>En este gráfico se puede ver como la aplicación crecería linealmente entre los </a:t>
-            </a:r>
-            <a:r>
-              <a:rPr lang="es-AR" baseline="0" dirty="0" err="1" smtClean="0"/>
-              <a:t>emses</a:t>
-            </a:r>
-            <a:r>
-              <a:rPr lang="es-AR" baseline="0" dirty="0" smtClean="0"/>
-              <a:t> 5 y 11, llegando a los 100mil usuarios y finalmente iría disminuyendo su crecimiento a partir de ahí hasta estancarse en 160mil usuarios. </a:t>
-            </a:r>
-          </a:p>
-          <a:p>
-            <a:r>
-              <a:rPr lang="es-AR" baseline="0" dirty="0" smtClean="0"/>
-              <a:t>En lo referente a los ingresos, los mismos tendrían un pico durante la expansión de la aplicación llegando a 35mil </a:t>
-            </a:r>
-            <a:r>
-              <a:rPr lang="es-AR" baseline="0" dirty="0" err="1" smtClean="0"/>
-              <a:t>doalres</a:t>
-            </a:r>
-            <a:r>
-              <a:rPr lang="es-AR" baseline="0" dirty="0" smtClean="0"/>
-              <a:t> por mes para finalmente converger a 20 mil </a:t>
-            </a:r>
-            <a:r>
-              <a:rPr lang="es-AR" baseline="0" dirty="0" err="1" smtClean="0"/>
+              <a:rPr lang="es-AR" sz="1200" b="0" i="0" kern="1200" baseline="0" dirty="0" smtClean="0">
+                <a:solidFill>
+                  <a:schemeClr val="tx1"/>
+                </a:solidFill>
+                <a:effectLst/>
+                <a:latin typeface="+mn-lt"/>
+                <a:ea typeface="+mn-ea"/>
+                <a:cs typeface="+mn-cs"/>
+              </a:rPr>
+              <a:t>multilenguaje) </a:t>
+            </a:r>
+            <a:r>
+              <a:rPr lang="es-AR" sz="1200" b="0" i="0" kern="1200" baseline="0" dirty="0" smtClean="0">
+                <a:solidFill>
+                  <a:schemeClr val="tx1"/>
+                </a:solidFill>
+                <a:effectLst/>
+                <a:latin typeface="+mn-lt"/>
+                <a:ea typeface="+mn-ea"/>
+                <a:cs typeface="+mn-cs"/>
+              </a:rPr>
+              <a:t>(a los 6 meses). </a:t>
+            </a:r>
+            <a:endParaRPr lang="es-AR" sz="1200" b="0" i="0" kern="1200" baseline="0" dirty="0" smtClean="0">
+              <a:solidFill>
+                <a:schemeClr val="tx1"/>
+              </a:solidFill>
+              <a:effectLst/>
+              <a:latin typeface="+mn-lt"/>
+              <a:ea typeface="+mn-ea"/>
+              <a:cs typeface="+mn-cs"/>
+            </a:endParaRPr>
+          </a:p>
+          <a:p>
+            <a:r>
+              <a:rPr lang="es-AR" sz="1200" b="0" i="0" kern="1200" baseline="0" dirty="0" smtClean="0">
+                <a:solidFill>
+                  <a:schemeClr val="tx1"/>
+                </a:solidFill>
+                <a:effectLst/>
+                <a:latin typeface="+mn-lt"/>
+                <a:ea typeface="+mn-ea"/>
+                <a:cs typeface="+mn-cs"/>
+              </a:rPr>
+              <a:t>Si consideramos que nuestra aplicación tiene todas a favor para resultar aún mas exitosa que esta aplicación y suponiendo que se realiza el soporte </a:t>
+            </a:r>
+            <a:r>
+              <a:rPr lang="es-AR" sz="1200" b="0" i="0" kern="1200" baseline="0" dirty="0" smtClean="0">
+                <a:solidFill>
+                  <a:schemeClr val="tx1"/>
+                </a:solidFill>
+                <a:effectLst/>
+                <a:latin typeface="+mn-lt"/>
+                <a:ea typeface="+mn-ea"/>
+                <a:cs typeface="+mn-cs"/>
+              </a:rPr>
+              <a:t>necesarios para dar soporte a diversos </a:t>
+            </a:r>
+            <a:r>
+              <a:rPr lang="es-AR" sz="1200" b="0" i="0" kern="1200" baseline="0" dirty="0" smtClean="0">
+                <a:solidFill>
+                  <a:schemeClr val="tx1"/>
+                </a:solidFill>
+                <a:effectLst/>
+                <a:latin typeface="+mn-lt"/>
+                <a:ea typeface="+mn-ea"/>
+                <a:cs typeface="+mn-cs"/>
+              </a:rPr>
+              <a:t>lenguajes y plataformas, se </a:t>
+            </a:r>
+            <a:r>
+              <a:rPr lang="es-AR" sz="1200" b="0" i="0" kern="1200" baseline="0" dirty="0" err="1" smtClean="0">
+                <a:solidFill>
+                  <a:schemeClr val="tx1"/>
+                </a:solidFill>
+                <a:effectLst/>
+                <a:latin typeface="+mn-lt"/>
+                <a:ea typeface="+mn-ea"/>
+                <a:cs typeface="+mn-cs"/>
+              </a:rPr>
+              <a:t>podria</a:t>
+            </a:r>
+            <a:r>
+              <a:rPr lang="es-AR" sz="1200" b="0" i="0" kern="1200" baseline="0" dirty="0" smtClean="0">
+                <a:solidFill>
+                  <a:schemeClr val="tx1"/>
+                </a:solidFill>
+                <a:effectLst/>
+                <a:latin typeface="+mn-lt"/>
+                <a:ea typeface="+mn-ea"/>
+                <a:cs typeface="+mn-cs"/>
+              </a:rPr>
+              <a:t> alcanzar sin inconvenientes el mismo nivel de usuarios. </a:t>
+            </a:r>
+          </a:p>
+          <a:p>
+            <a:r>
+              <a:rPr lang="es-AR" sz="1200" b="0" i="0" kern="1200" baseline="0" dirty="0" smtClean="0">
+                <a:solidFill>
+                  <a:schemeClr val="tx1"/>
+                </a:solidFill>
+                <a:effectLst/>
+                <a:latin typeface="+mn-lt"/>
+                <a:ea typeface="+mn-ea"/>
+                <a:cs typeface="+mn-cs"/>
+              </a:rPr>
+              <a:t>En lo referente a </a:t>
+            </a:r>
+            <a:r>
+              <a:rPr lang="es-AR" sz="1200" b="0" i="0" kern="1200" baseline="0" dirty="0" err="1" smtClean="0">
+                <a:solidFill>
+                  <a:schemeClr val="tx1"/>
+                </a:solidFill>
+                <a:effectLst/>
+                <a:latin typeface="+mn-lt"/>
+                <a:ea typeface="+mn-ea"/>
+                <a:cs typeface="+mn-cs"/>
+              </a:rPr>
+              <a:t>ganacias</a:t>
+            </a:r>
+            <a:r>
+              <a:rPr lang="es-AR" sz="1200" b="0" i="0" kern="1200" baseline="0" dirty="0" smtClean="0">
+                <a:solidFill>
+                  <a:schemeClr val="tx1"/>
+                </a:solidFill>
+                <a:effectLst/>
+                <a:latin typeface="+mn-lt"/>
+                <a:ea typeface="+mn-ea"/>
+                <a:cs typeface="+mn-cs"/>
+              </a:rPr>
+              <a:t>, las mismas serían al </a:t>
+            </a:r>
+            <a:r>
+              <a:rPr lang="es-AR" sz="1200" b="0" i="0" kern="1200" baseline="0" dirty="0" err="1" smtClean="0">
+                <a:solidFill>
+                  <a:schemeClr val="tx1"/>
+                </a:solidFill>
+                <a:effectLst/>
+                <a:latin typeface="+mn-lt"/>
+                <a:ea typeface="+mn-ea"/>
+                <a:cs typeface="+mn-cs"/>
+              </a:rPr>
+              <a:t>alzancar</a:t>
+            </a:r>
+            <a:r>
+              <a:rPr lang="es-AR" sz="1200" b="0" i="0" kern="1200" baseline="0" dirty="0" smtClean="0">
+                <a:solidFill>
+                  <a:schemeClr val="tx1"/>
+                </a:solidFill>
+                <a:effectLst/>
+                <a:latin typeface="+mn-lt"/>
+                <a:ea typeface="+mn-ea"/>
+                <a:cs typeface="+mn-cs"/>
+              </a:rPr>
+              <a:t> los 2 años de </a:t>
+            </a:r>
+            <a:r>
+              <a:rPr lang="es-AR" sz="1200" b="0" i="0" kern="1200" baseline="0" dirty="0" smtClean="0">
+                <a:solidFill>
+                  <a:schemeClr val="tx1"/>
+                </a:solidFill>
+                <a:effectLst/>
+                <a:latin typeface="+mn-lt"/>
+                <a:ea typeface="+mn-ea"/>
+                <a:cs typeface="+mn-cs"/>
+              </a:rPr>
+              <a:t>entre los 270k a 400k al </a:t>
+            </a:r>
+            <a:r>
+              <a:rPr lang="es-AR" sz="1200" b="0" i="0" kern="1200" baseline="0" dirty="0" smtClean="0">
+                <a:solidFill>
+                  <a:schemeClr val="tx1"/>
+                </a:solidFill>
+                <a:effectLst/>
+                <a:latin typeface="+mn-lt"/>
+                <a:ea typeface="+mn-ea"/>
+                <a:cs typeface="+mn-cs"/>
+              </a:rPr>
+              <a:t>mes, teniendo en cuenta los mismos precios para las publicidades que en el escenario anterior. Como pueden ver, un gran negocio</a:t>
+            </a:r>
+            <a:r>
+              <a:rPr lang="es-AR" sz="1200" b="0" i="0" kern="1200" baseline="0" dirty="0" smtClean="0">
+                <a:solidFill>
+                  <a:schemeClr val="tx1"/>
+                </a:solidFill>
+                <a:effectLst/>
+                <a:latin typeface="+mn-lt"/>
+                <a:ea typeface="+mn-ea"/>
+                <a:cs typeface="+mn-cs"/>
+              </a:rPr>
+              <a:t>.</a:t>
+            </a:r>
+          </a:p>
+          <a:p>
+            <a:r>
+              <a:rPr lang="es-AR" sz="1200" b="0" i="0" kern="1200" baseline="0" dirty="0" smtClean="0">
+                <a:solidFill>
+                  <a:schemeClr val="tx1"/>
+                </a:solidFill>
+                <a:effectLst/>
+                <a:latin typeface="+mn-lt"/>
+                <a:ea typeface="+mn-ea"/>
+                <a:cs typeface="+mn-cs"/>
+              </a:rPr>
+              <a:t>Un detalle de color que nos gustaría destacar es que a los 18 meses del lanzamiento, </a:t>
+            </a:r>
+            <a:r>
+              <a:rPr lang="es-AR" sz="1200" b="0" i="0" kern="1200" baseline="0" dirty="0" err="1" smtClean="0">
+                <a:solidFill>
+                  <a:schemeClr val="tx1"/>
+                </a:solidFill>
+                <a:effectLst/>
+                <a:latin typeface="+mn-lt"/>
+                <a:ea typeface="+mn-ea"/>
+                <a:cs typeface="+mn-cs"/>
+              </a:rPr>
+              <a:t>facebook</a:t>
+            </a:r>
+            <a:r>
+              <a:rPr lang="es-AR" sz="1200" b="0" i="0" kern="1200" baseline="0" dirty="0" smtClean="0">
+                <a:solidFill>
+                  <a:schemeClr val="tx1"/>
+                </a:solidFill>
+                <a:effectLst/>
+                <a:latin typeface="+mn-lt"/>
+                <a:ea typeface="+mn-ea"/>
+                <a:cs typeface="+mn-cs"/>
+              </a:rPr>
+              <a:t> lanzó una aplicación similar que como pueden ver afectó realmente poco el crecimiento de la aplicación.</a:t>
+            </a:r>
+            <a:endParaRPr lang="es-AR" sz="1200" b="0" i="0" kern="1200" baseline="0" dirty="0" smtClean="0">
+              <a:solidFill>
+                <a:schemeClr val="tx1"/>
+              </a:solidFill>
+              <a:effectLst/>
+              <a:latin typeface="+mn-lt"/>
+              <a:ea typeface="+mn-ea"/>
+              <a:cs typeface="+mn-cs"/>
+            </a:endParaRPr>
+          </a:p>
+          <a:p>
+            <a:r>
+              <a:rPr lang="es-AR" sz="1200" b="0" i="0" kern="1200" baseline="0" dirty="0" smtClean="0">
+                <a:solidFill>
+                  <a:schemeClr val="tx1"/>
+                </a:solidFill>
+                <a:effectLst/>
+                <a:latin typeface="+mn-lt"/>
+                <a:ea typeface="+mn-ea"/>
+                <a:cs typeface="+mn-cs"/>
+              </a:rPr>
+              <a:t>Finalmente </a:t>
+            </a:r>
+            <a:r>
+              <a:rPr lang="es-AR" sz="1200" b="0" i="0" kern="1200" baseline="0" smtClean="0">
+                <a:solidFill>
+                  <a:schemeClr val="tx1"/>
+                </a:solidFill>
+                <a:effectLst/>
+                <a:latin typeface="+mn-lt"/>
+                <a:ea typeface="+mn-ea"/>
+                <a:cs typeface="+mn-cs"/>
+              </a:rPr>
+              <a:t>un último detalle </a:t>
+            </a:r>
+            <a:r>
+              <a:rPr lang="es-AR" sz="1200" b="0" i="0" kern="1200" baseline="0" dirty="0" smtClean="0">
+                <a:solidFill>
+                  <a:schemeClr val="tx1"/>
+                </a:solidFill>
+                <a:effectLst/>
+                <a:latin typeface="+mn-lt"/>
+                <a:ea typeface="+mn-ea"/>
+                <a:cs typeface="+mn-cs"/>
+              </a:rPr>
+              <a:t>no menor es que la empresa </a:t>
+            </a:r>
+            <a:r>
+              <a:rPr lang="es-AR" sz="1200" b="0" i="0" kern="1200" baseline="0" dirty="0" err="1" smtClean="0">
+                <a:solidFill>
+                  <a:schemeClr val="tx1"/>
+                </a:solidFill>
+                <a:effectLst/>
+                <a:latin typeface="+mn-lt"/>
+                <a:ea typeface="+mn-ea"/>
+                <a:cs typeface="+mn-cs"/>
+              </a:rPr>
+              <a:t>Foursqare</a:t>
+            </a:r>
+            <a:r>
+              <a:rPr lang="es-AR" sz="1200" b="0" i="0" kern="1200" baseline="0" dirty="0" smtClean="0">
+                <a:solidFill>
+                  <a:schemeClr val="tx1"/>
+                </a:solidFill>
+                <a:effectLst/>
+                <a:latin typeface="+mn-lt"/>
+                <a:ea typeface="+mn-ea"/>
+                <a:cs typeface="+mn-cs"/>
+              </a:rPr>
+              <a:t> posee hoy en día (4 años después de su lanzamiento)  posee 30 millones de usuarios, </a:t>
+            </a:r>
+            <a:r>
+              <a:rPr lang="es-AR" sz="1200" b="0" i="0" kern="1200" baseline="0" dirty="0" smtClean="0">
+                <a:solidFill>
+                  <a:schemeClr val="tx1"/>
+                </a:solidFill>
+                <a:effectLst/>
+                <a:latin typeface="+mn-lt"/>
+                <a:ea typeface="+mn-ea"/>
+                <a:cs typeface="+mn-cs"/>
+              </a:rPr>
+              <a:t>realizando las cuentas bajo el mismo modelo, daría un ingreso de 1millon de </a:t>
+            </a:r>
+            <a:r>
+              <a:rPr lang="es-AR" sz="1200" b="0" i="0" kern="1200" baseline="0" dirty="0" err="1" smtClean="0">
+                <a:solidFill>
+                  <a:schemeClr val="tx1"/>
+                </a:solidFill>
+                <a:effectLst/>
+                <a:latin typeface="+mn-lt"/>
+                <a:ea typeface="+mn-ea"/>
+                <a:cs typeface="+mn-cs"/>
+              </a:rPr>
               <a:t>dolares</a:t>
             </a:r>
             <a:r>
-              <a:rPr lang="es-AR" baseline="0" dirty="0" smtClean="0"/>
-              <a:t> por mes. Teniendo en cuenta que el gasto para mantener la aplicación son casi mínimos (tan solo un servidor) , casi todo sería ganancias.</a:t>
-            </a:r>
-          </a:p>
-          <a:p>
-            <a:r>
-              <a:rPr lang="es-AR" baseline="0" dirty="0" smtClean="0"/>
-              <a:t>Finalmente se puede concluir, que siendo este el peor escenario posible, teniendo en cuenta los precios mas bajos del mercado en lo referente a publicidad, sin considerar la </a:t>
-            </a:r>
-            <a:r>
-              <a:rPr lang="es-AR" baseline="0" dirty="0" err="1" smtClean="0"/>
-              <a:t>expansion</a:t>
-            </a:r>
-            <a:r>
-              <a:rPr lang="es-AR" baseline="0" dirty="0" smtClean="0"/>
-              <a:t> del mercado de </a:t>
-            </a:r>
-            <a:r>
-              <a:rPr lang="es-AR" baseline="0" dirty="0" err="1" smtClean="0"/>
-              <a:t>smartphones</a:t>
-            </a:r>
-            <a:r>
-              <a:rPr lang="es-AR" baseline="0" dirty="0" smtClean="0"/>
-              <a:t> en un futuro y considerando tan solo una expansión del 3%, el negocio daría considerables </a:t>
-            </a:r>
-            <a:r>
-              <a:rPr lang="es-AR" baseline="0" dirty="0" err="1" smtClean="0"/>
-              <a:t>ganacias</a:t>
-            </a:r>
-            <a:r>
-              <a:rPr lang="es-AR" baseline="0" dirty="0" smtClean="0"/>
-              <a:t>.</a:t>
-            </a:r>
-          </a:p>
-          <a:p>
-            <a:r>
-              <a:rPr lang="es-AR" baseline="0" dirty="0" smtClean="0"/>
-              <a:t>Sin embargo, ahora nos podríamos preguntar, y si la aplicación es realmente un éxito y se expande a otros mercados con una captación mayor?</a:t>
-            </a:r>
+              <a:rPr lang="es-AR" sz="1200" b="0" i="0" kern="1200" baseline="0" dirty="0" smtClean="0">
+                <a:solidFill>
+                  <a:schemeClr val="tx1"/>
+                </a:solidFill>
+                <a:effectLst/>
+                <a:latin typeface="+mn-lt"/>
+                <a:ea typeface="+mn-ea"/>
+                <a:cs typeface="+mn-cs"/>
+              </a:rPr>
+              <a:t> al mes.</a:t>
+            </a:r>
+            <a:endParaRPr lang="es-AR" sz="1200" b="0" i="0" kern="1200" baseline="0" dirty="0" smtClean="0">
+              <a:solidFill>
+                <a:schemeClr val="tx1"/>
+              </a:solidFill>
+              <a:effectLst/>
+              <a:latin typeface="+mn-lt"/>
+              <a:ea typeface="+mn-ea"/>
+              <a:cs typeface="+mn-cs"/>
+            </a:endParaRPr>
           </a:p>
         </p:txBody>
       </p:sp>
@@ -4254,7 +4885,7 @@
     </p:spTree>
     <p:extLst>
       <p:ext uri="{BB962C8B-B14F-4D97-AF65-F5344CB8AC3E}">
-        <p14:creationId xmlns:p14="http://schemas.microsoft.com/office/powerpoint/2010/main" val="3003342862"/>
+        <p14:creationId xmlns:p14="http://schemas.microsoft.com/office/powerpoint/2010/main" val="3000085410"/>
       </p:ext>
     </p:extLst>
   </p:cSld>
@@ -4308,376 +4939,7 @@
           <a:bodyPr/>
           <a:lstStyle/>
           <a:p>
-            <a:r>
-              <a:rPr lang="es-AR" dirty="0" smtClean="0"/>
-              <a:t>En ese escenario, hemos tomado los datos de una empresa</a:t>
-            </a:r>
-            <a:r>
-              <a:rPr lang="es-AR" baseline="0" dirty="0" smtClean="0"/>
-              <a:t> similar (como </a:t>
-            </a:r>
-            <a:r>
-              <a:rPr lang="es-AR" baseline="0" dirty="0" err="1" smtClean="0"/>
-              <a:t>Foursqare</a:t>
-            </a:r>
-            <a:r>
-              <a:rPr lang="es-AR" baseline="0" dirty="0" smtClean="0"/>
-              <a:t>) y su crecimiento en sus dos primeros años. Para quienes no conozcan esta compañía, la misma </a:t>
-            </a:r>
-            <a:r>
-              <a:rPr lang="es-AR" sz="1200" b="0" i="0" kern="1200" dirty="0" smtClean="0">
-                <a:solidFill>
-                  <a:schemeClr val="tx1"/>
-                </a:solidFill>
-                <a:effectLst/>
-                <a:latin typeface="+mn-lt"/>
-                <a:ea typeface="+mn-ea"/>
-                <a:cs typeface="+mn-cs"/>
-              </a:rPr>
-              <a:t>es un </a:t>
-            </a:r>
-            <a:r>
-              <a:rPr lang="es-AR" sz="1200" b="0" i="0" u="none" strike="noStrike" kern="1200" dirty="0" smtClean="0">
-                <a:solidFill>
-                  <a:schemeClr val="tx1"/>
-                </a:solidFill>
-                <a:effectLst/>
-                <a:latin typeface="+mn-lt"/>
-                <a:ea typeface="+mn-ea"/>
-                <a:cs typeface="+mn-cs"/>
-                <a:hlinkClick r:id="rId3" tooltip="Servicio basado en localización"/>
-              </a:rPr>
-              <a:t>servicio basado en localización</a:t>
-            </a:r>
-            <a:r>
-              <a:rPr lang="es-AR" sz="1200" b="0" i="0" kern="1200" dirty="0" smtClean="0">
-                <a:solidFill>
-                  <a:schemeClr val="tx1"/>
-                </a:solidFill>
-                <a:effectLst/>
-                <a:latin typeface="+mn-lt"/>
-                <a:ea typeface="+mn-ea"/>
-                <a:cs typeface="+mn-cs"/>
-              </a:rPr>
-              <a:t> web aplicada a las </a:t>
-            </a:r>
-            <a:r>
-              <a:rPr lang="es-AR" sz="1200" b="0" i="0" u="none" strike="noStrike" kern="1200" dirty="0" smtClean="0">
-                <a:solidFill>
-                  <a:schemeClr val="tx1"/>
-                </a:solidFill>
-                <a:effectLst/>
-                <a:latin typeface="+mn-lt"/>
-                <a:ea typeface="+mn-ea"/>
-                <a:cs typeface="+mn-cs"/>
-                <a:hlinkClick r:id="rId4" tooltip="Redes sociales"/>
-              </a:rPr>
-              <a:t>redes sociales</a:t>
-            </a:r>
-            <a:r>
-              <a:rPr lang="es-AR" sz="1200" b="0" i="0" kern="1200" dirty="0" smtClean="0">
-                <a:solidFill>
-                  <a:schemeClr val="tx1"/>
-                </a:solidFill>
-                <a:effectLst/>
-                <a:latin typeface="+mn-lt"/>
-                <a:ea typeface="+mn-ea"/>
-                <a:cs typeface="+mn-cs"/>
-              </a:rPr>
-              <a:t>. La </a:t>
-            </a:r>
-            <a:r>
-              <a:rPr lang="es-AR" sz="1200" b="0" i="0" kern="1200" dirty="0" err="1" smtClean="0">
-                <a:solidFill>
-                  <a:schemeClr val="tx1"/>
-                </a:solidFill>
-                <a:effectLst/>
-                <a:latin typeface="+mn-lt"/>
-                <a:ea typeface="+mn-ea"/>
-                <a:cs typeface="+mn-cs"/>
-              </a:rPr>
-              <a:t>geolocalización</a:t>
-            </a:r>
-            <a:r>
-              <a:rPr lang="es-AR" sz="1200" b="0" i="0" kern="1200" dirty="0" smtClean="0">
-                <a:solidFill>
-                  <a:schemeClr val="tx1"/>
-                </a:solidFill>
-                <a:effectLst/>
-                <a:latin typeface="+mn-lt"/>
-                <a:ea typeface="+mn-ea"/>
-                <a:cs typeface="+mn-cs"/>
-              </a:rPr>
-              <a:t> permite localizar un dispositivo fijo o móvil en una ubicación geográfica.</a:t>
-            </a:r>
-            <a:r>
-              <a:rPr lang="es-AR" sz="1200" b="0" i="0" kern="1200" baseline="0" dirty="0" smtClean="0">
-                <a:solidFill>
-                  <a:schemeClr val="tx1"/>
-                </a:solidFill>
-                <a:effectLst/>
-                <a:latin typeface="+mn-lt"/>
-                <a:ea typeface="+mn-ea"/>
-                <a:cs typeface="+mn-cs"/>
-              </a:rPr>
-              <a:t> Si bien es una aplicación exitosa, no es considerada como una aplicación especialmente </a:t>
-            </a:r>
-            <a:r>
-              <a:rPr lang="es-AR" sz="1200" b="0" i="0" kern="1200" baseline="0" dirty="0" err="1" smtClean="0">
-                <a:solidFill>
-                  <a:schemeClr val="tx1"/>
-                </a:solidFill>
-                <a:effectLst/>
-                <a:latin typeface="+mn-lt"/>
-                <a:ea typeface="+mn-ea"/>
-                <a:cs typeface="+mn-cs"/>
-              </a:rPr>
-              <a:t>virosica</a:t>
-            </a:r>
-            <a:r>
-              <a:rPr lang="es-AR" sz="1200" b="0" i="0" kern="1200" baseline="0" dirty="0" smtClean="0">
-                <a:solidFill>
-                  <a:schemeClr val="tx1"/>
-                </a:solidFill>
-                <a:effectLst/>
-                <a:latin typeface="+mn-lt"/>
-                <a:ea typeface="+mn-ea"/>
-                <a:cs typeface="+mn-cs"/>
-              </a:rPr>
-              <a:t> ni con un extremo furor. La misma alcanzo a los 2 años de su lanzamiento 8 millones de usuarios. Lo consiguió al expandirse en varias regiones (su </a:t>
-            </a:r>
-            <a:r>
-              <a:rPr lang="es-AR" sz="1200" b="0" i="0" kern="1200" baseline="0" dirty="0" err="1" smtClean="0">
-                <a:solidFill>
-                  <a:schemeClr val="tx1"/>
-                </a:solidFill>
-                <a:effectLst/>
-                <a:latin typeface="+mn-lt"/>
-                <a:ea typeface="+mn-ea"/>
-                <a:cs typeface="+mn-cs"/>
-              </a:rPr>
-              <a:t>aplicacióne</a:t>
-            </a:r>
-            <a:r>
-              <a:rPr lang="es-AR" sz="1200" b="0" i="0" kern="1200" baseline="0" dirty="0" smtClean="0">
-                <a:solidFill>
-                  <a:schemeClr val="tx1"/>
-                </a:solidFill>
-                <a:effectLst/>
-                <a:latin typeface="+mn-lt"/>
-                <a:ea typeface="+mn-ea"/>
-                <a:cs typeface="+mn-cs"/>
-              </a:rPr>
-              <a:t> s multilenguaje) así como en varias plataformas. </a:t>
-            </a:r>
-          </a:p>
-          <a:p>
-            <a:r>
-              <a:rPr lang="es-AR" sz="1200" b="0" i="0" kern="1200" baseline="0" dirty="0" smtClean="0">
-                <a:solidFill>
-                  <a:schemeClr val="tx1"/>
-                </a:solidFill>
-                <a:effectLst/>
-                <a:latin typeface="+mn-lt"/>
-                <a:ea typeface="+mn-ea"/>
-                <a:cs typeface="+mn-cs"/>
-              </a:rPr>
-              <a:t>Si consideramos que nuestra aplicación tiene todas a favor para resultar aún mas exitosa que esta aplicación y suponiendo que se realiza el soporte necesario para aproximadamente al año de su lanzamiento en </a:t>
-            </a:r>
-            <a:r>
-              <a:rPr lang="es-AR" sz="1200" b="0" i="0" kern="1200" baseline="0" dirty="0" err="1" smtClean="0">
-                <a:solidFill>
-                  <a:schemeClr val="tx1"/>
-                </a:solidFill>
-                <a:effectLst/>
-                <a:latin typeface="+mn-lt"/>
-                <a:ea typeface="+mn-ea"/>
-                <a:cs typeface="+mn-cs"/>
-              </a:rPr>
-              <a:t>android</a:t>
-            </a:r>
-            <a:r>
-              <a:rPr lang="es-AR" sz="1200" b="0" i="0" kern="1200" baseline="0" dirty="0" smtClean="0">
-                <a:solidFill>
-                  <a:schemeClr val="tx1"/>
-                </a:solidFill>
-                <a:effectLst/>
-                <a:latin typeface="+mn-lt"/>
-                <a:ea typeface="+mn-ea"/>
-                <a:cs typeface="+mn-cs"/>
-              </a:rPr>
-              <a:t>, realizar los cambios oportunos para que soporte diversos lenguajes y plataformas, se </a:t>
-            </a:r>
-            <a:r>
-              <a:rPr lang="es-AR" sz="1200" b="0" i="0" kern="1200" baseline="0" dirty="0" err="1" smtClean="0">
-                <a:solidFill>
-                  <a:schemeClr val="tx1"/>
-                </a:solidFill>
-                <a:effectLst/>
-                <a:latin typeface="+mn-lt"/>
-                <a:ea typeface="+mn-ea"/>
-                <a:cs typeface="+mn-cs"/>
-              </a:rPr>
-              <a:t>podria</a:t>
-            </a:r>
-            <a:r>
-              <a:rPr lang="es-AR" sz="1200" b="0" i="0" kern="1200" baseline="0" dirty="0" smtClean="0">
-                <a:solidFill>
-                  <a:schemeClr val="tx1"/>
-                </a:solidFill>
-                <a:effectLst/>
-                <a:latin typeface="+mn-lt"/>
-                <a:ea typeface="+mn-ea"/>
-                <a:cs typeface="+mn-cs"/>
-              </a:rPr>
-              <a:t> alcanzar sin inconvenientes el mismo nivel de usuarios. </a:t>
-            </a:r>
-          </a:p>
-          <a:p>
-            <a:r>
-              <a:rPr lang="es-AR" sz="1200" b="0" i="0" kern="1200" baseline="0" dirty="0" smtClean="0">
-                <a:solidFill>
-                  <a:schemeClr val="tx1"/>
-                </a:solidFill>
-                <a:effectLst/>
-                <a:latin typeface="+mn-lt"/>
-                <a:ea typeface="+mn-ea"/>
-                <a:cs typeface="+mn-cs"/>
-              </a:rPr>
-              <a:t>En lo referente a </a:t>
-            </a:r>
-            <a:r>
-              <a:rPr lang="es-AR" sz="1200" b="0" i="0" kern="1200" baseline="0" dirty="0" err="1" smtClean="0">
-                <a:solidFill>
-                  <a:schemeClr val="tx1"/>
-                </a:solidFill>
-                <a:effectLst/>
-                <a:latin typeface="+mn-lt"/>
-                <a:ea typeface="+mn-ea"/>
-                <a:cs typeface="+mn-cs"/>
-              </a:rPr>
-              <a:t>ganacias</a:t>
-            </a:r>
-            <a:r>
-              <a:rPr lang="es-AR" sz="1200" b="0" i="0" kern="1200" baseline="0" dirty="0" smtClean="0">
-                <a:solidFill>
-                  <a:schemeClr val="tx1"/>
-                </a:solidFill>
-                <a:effectLst/>
-                <a:latin typeface="+mn-lt"/>
-                <a:ea typeface="+mn-ea"/>
-                <a:cs typeface="+mn-cs"/>
-              </a:rPr>
-              <a:t>, las mismas serían al </a:t>
-            </a:r>
-            <a:r>
-              <a:rPr lang="es-AR" sz="1200" b="0" i="0" kern="1200" baseline="0" dirty="0" err="1" smtClean="0">
-                <a:solidFill>
-                  <a:schemeClr val="tx1"/>
-                </a:solidFill>
-                <a:effectLst/>
-                <a:latin typeface="+mn-lt"/>
-                <a:ea typeface="+mn-ea"/>
-                <a:cs typeface="+mn-cs"/>
-              </a:rPr>
-              <a:t>alzancar</a:t>
-            </a:r>
-            <a:r>
-              <a:rPr lang="es-AR" sz="1200" b="0" i="0" kern="1200" baseline="0" dirty="0" smtClean="0">
-                <a:solidFill>
-                  <a:schemeClr val="tx1"/>
-                </a:solidFill>
-                <a:effectLst/>
-                <a:latin typeface="+mn-lt"/>
-                <a:ea typeface="+mn-ea"/>
-                <a:cs typeface="+mn-cs"/>
-              </a:rPr>
-              <a:t> los 2 años de 7 millones y medio de dólares al mes, teniendo en cuenta los mismos precios para las publicidades que en el escenario anterior. Como pueden ver, un gran negocio.</a:t>
-            </a:r>
-          </a:p>
-          <a:p>
-            <a:r>
-              <a:rPr lang="es-AR" sz="1200" b="0" i="0" kern="1200" baseline="0" dirty="0" smtClean="0">
-                <a:solidFill>
-                  <a:schemeClr val="tx1"/>
-                </a:solidFill>
-                <a:effectLst/>
-                <a:latin typeface="+mn-lt"/>
-                <a:ea typeface="+mn-ea"/>
-                <a:cs typeface="+mn-cs"/>
-              </a:rPr>
-              <a:t>Tan solo un detalle no menor es que la empresa </a:t>
-            </a:r>
-            <a:r>
-              <a:rPr lang="es-AR" sz="1200" b="0" i="0" kern="1200" baseline="0" dirty="0" err="1" smtClean="0">
-                <a:solidFill>
-                  <a:schemeClr val="tx1"/>
-                </a:solidFill>
-                <a:effectLst/>
-                <a:latin typeface="+mn-lt"/>
-                <a:ea typeface="+mn-ea"/>
-                <a:cs typeface="+mn-cs"/>
-              </a:rPr>
-              <a:t>Foursqare</a:t>
-            </a:r>
-            <a:r>
-              <a:rPr lang="es-AR" sz="1200" b="0" i="0" kern="1200" baseline="0" dirty="0" smtClean="0">
-                <a:solidFill>
-                  <a:schemeClr val="tx1"/>
-                </a:solidFill>
-                <a:effectLst/>
-                <a:latin typeface="+mn-lt"/>
-                <a:ea typeface="+mn-ea"/>
-                <a:cs typeface="+mn-cs"/>
-              </a:rPr>
-              <a:t> posee hoy en día (4 años después de su lanzamiento)  posee 30 millones de usuarios, por lo que señores, pueden realizar </a:t>
-            </a:r>
-            <a:r>
-              <a:rPr lang="es-AR" sz="1200" b="0" i="0" kern="1200" baseline="0" dirty="0" err="1" smtClean="0">
-                <a:solidFill>
-                  <a:schemeClr val="tx1"/>
-                </a:solidFill>
-                <a:effectLst/>
-                <a:latin typeface="+mn-lt"/>
-                <a:ea typeface="+mn-ea"/>
-                <a:cs typeface="+mn-cs"/>
-              </a:rPr>
-              <a:t>uds</a:t>
-            </a:r>
-            <a:r>
-              <a:rPr lang="es-AR" sz="1200" b="0" i="0" kern="1200" baseline="0" dirty="0" smtClean="0">
-                <a:solidFill>
-                  <a:schemeClr val="tx1"/>
-                </a:solidFill>
-                <a:effectLst/>
-                <a:latin typeface="+mn-lt"/>
-                <a:ea typeface="+mn-ea"/>
-                <a:cs typeface="+mn-cs"/>
-              </a:rPr>
-              <a:t> mismos las cuentas del negocio que les estamos presentando el día de hoy </a:t>
-            </a:r>
-            <a:r>
-              <a:rPr lang="es-AR" sz="1200" b="0" i="0" kern="1200" baseline="0" dirty="0" smtClean="0">
-                <a:solidFill>
-                  <a:schemeClr val="tx1"/>
-                </a:solidFill>
-                <a:effectLst/>
-                <a:latin typeface="+mn-lt"/>
-                <a:ea typeface="+mn-ea"/>
-                <a:cs typeface="+mn-cs"/>
-                <a:sym typeface="Wingdings" pitchFamily="2" charset="2"/>
-              </a:rPr>
-              <a:t></a:t>
-            </a:r>
-            <a:endParaRPr lang="es-AR" sz="1200" b="0" i="0" kern="1200" baseline="0" dirty="0" smtClean="0">
-              <a:solidFill>
-                <a:schemeClr val="tx1"/>
-              </a:solidFill>
-              <a:effectLst/>
-              <a:latin typeface="+mn-lt"/>
-              <a:ea typeface="+mn-ea"/>
-              <a:cs typeface="+mn-cs"/>
-            </a:endParaRPr>
+            <a:endParaRPr lang="es-AR" dirty="0"/>
           </a:p>
         </p:txBody>
       </p:sp>
@@ -4708,7 +4970,7 @@
     </p:spTree>
     <p:extLst>
       <p:ext uri="{BB962C8B-B14F-4D97-AF65-F5344CB8AC3E}">
-        <p14:creationId xmlns:p14="http://schemas.microsoft.com/office/powerpoint/2010/main" val="3000085410"/>
+        <p14:creationId xmlns:p14="http://schemas.microsoft.com/office/powerpoint/2010/main" val="1057133531"/>
       </p:ext>
     </p:extLst>
   </p:cSld>
@@ -8459,127 +8721,61 @@
         </p:nvSpPr>
         <p:spPr/>
         <p:txBody>
-          <a:bodyPr/>
-          <a:lstStyle/>
-          <a:p>
-            <a:r>
-              <a:rPr lang="es-AR" dirty="0" smtClean="0"/>
-              <a:t>Publicidad</a:t>
-            </a:r>
-            <a:endParaRPr lang="es-AR" dirty="0"/>
-          </a:p>
-        </p:txBody>
-      </p:sp>
-      <p:pic>
-        <p:nvPicPr>
-          <p:cNvPr id="4" name="Content Placeholder 3"/>
-          <p:cNvPicPr>
-            <a:picLocks noGrp="1" noChangeAspect="1"/>
-          </p:cNvPicPr>
-          <p:nvPr>
-            <p:ph idx="1"/>
-          </p:nvPr>
-        </p:nvPicPr>
-        <p:blipFill>
-          <a:blip r:embed="rId3" cstate="print">
-            <a:extLst>
-              <a:ext uri="{28A0092B-C50C-407E-A947-70E740481C1C}">
-                <a14:useLocalDpi xmlns:a14="http://schemas.microsoft.com/office/drawing/2010/main" val="0"/>
-              </a:ext>
-            </a:extLst>
-          </a:blip>
-          <a:stretch>
-            <a:fillRect/>
-          </a:stretch>
-        </p:blipFill>
-        <p:spPr>
-          <a:xfrm>
-            <a:off x="5004048" y="1556792"/>
-            <a:ext cx="2545854" cy="4525963"/>
-          </a:xfrm>
-        </p:spPr>
-      </p:pic>
-      <p:sp>
-        <p:nvSpPr>
-          <p:cNvPr id="5" name="TextBox 4"/>
-          <p:cNvSpPr txBox="1"/>
-          <p:nvPr/>
-        </p:nvSpPr>
-        <p:spPr>
-          <a:xfrm>
-            <a:off x="755576" y="1988840"/>
-            <a:ext cx="3419872" cy="4001095"/>
-          </a:xfrm>
-          <a:prstGeom prst="rect">
-            <a:avLst/>
-          </a:prstGeom>
-          <a:noFill/>
-        </p:spPr>
-        <p:txBody>
-          <a:bodyPr wrap="square" rtlCol="0">
-            <a:spAutoFit/>
+          <a:bodyPr>
+            <a:normAutofit fontScale="90000"/>
           </a:bodyPr>
           <a:lstStyle/>
           <a:p>
             <a:r>
-              <a:rPr lang="es-AR" sz="3000" dirty="0" smtClean="0"/>
-              <a:t>Embebida en la aplicación.</a:t>
-            </a:r>
-            <a:r>
-              <a:rPr lang="es-AR" sz="3000" dirty="0"/>
-              <a:t> </a:t>
-            </a:r>
-            <a:endParaRPr lang="es-AR" sz="3000" dirty="0" smtClean="0"/>
-          </a:p>
-          <a:p>
-            <a:endParaRPr lang="es-AR" sz="3000" dirty="0" smtClean="0"/>
-          </a:p>
-          <a:p>
-            <a:r>
-              <a:rPr lang="es-AR" sz="3000" dirty="0" smtClean="0"/>
-              <a:t>Cantidad </a:t>
-            </a:r>
-            <a:r>
-              <a:rPr lang="es-AR" sz="3000" dirty="0"/>
-              <a:t>de </a:t>
-            </a:r>
-            <a:r>
-              <a:rPr lang="es-AR" sz="3000" dirty="0" smtClean="0"/>
-              <a:t>vistas.</a:t>
-            </a:r>
-          </a:p>
-          <a:p>
-            <a:r>
-              <a:rPr lang="es-AR" sz="3000" dirty="0" smtClean="0"/>
-              <a:t>Cantidad de </a:t>
-            </a:r>
-            <a:r>
-              <a:rPr lang="es-AR" sz="3000" dirty="0" err="1" smtClean="0"/>
-              <a:t>clicks</a:t>
-            </a:r>
-            <a:r>
-              <a:rPr lang="es-AR" sz="3000" dirty="0" smtClean="0"/>
-              <a:t>.</a:t>
-            </a:r>
-          </a:p>
-          <a:p>
-            <a:endParaRPr lang="es-AR" sz="3000" dirty="0" smtClean="0"/>
-          </a:p>
-          <a:p>
-            <a:endParaRPr lang="es-AR" sz="3000" dirty="0"/>
-          </a:p>
-          <a:p>
-            <a:endParaRPr lang="es-AR" dirty="0"/>
-          </a:p>
-          <a:p>
-            <a:endParaRPr lang="es-AR" dirty="0"/>
-          </a:p>
-        </p:txBody>
-      </p:sp>
+              <a:rPr lang="es-AR" dirty="0" smtClean="0"/>
+              <a:t>Peor Caso</a:t>
+            </a:r>
+            <a:br>
+              <a:rPr lang="es-AR" dirty="0" smtClean="0"/>
+            </a:br>
+            <a:r>
+              <a:rPr lang="es-AR" sz="4000" dirty="0" smtClean="0"/>
+              <a:t>Expansión en Argentina con un 3% </a:t>
+            </a:r>
+            <a:br>
+              <a:rPr lang="es-AR" sz="4000" dirty="0" smtClean="0"/>
+            </a:br>
+            <a:r>
+              <a:rPr lang="es-AR" sz="4000" dirty="0" smtClean="0"/>
+              <a:t>del  mercado</a:t>
+            </a:r>
+            <a:endParaRPr lang="es-AR" sz="4000" dirty="0"/>
+          </a:p>
+        </p:txBody>
+      </p:sp>
+      <p:graphicFrame>
+        <p:nvGraphicFramePr>
+          <p:cNvPr id="6" name="Chart 5"/>
+          <p:cNvGraphicFramePr>
+            <a:graphicFrameLocks/>
+          </p:cNvGraphicFramePr>
+          <p:nvPr>
+            <p:extLst>
+              <p:ext uri="{D42A27DB-BD31-4B8C-83A1-F6EECF244321}">
+                <p14:modId xmlns:p14="http://schemas.microsoft.com/office/powerpoint/2010/main" val="3839376626"/>
+              </p:ext>
+            </p:extLst>
+          </p:nvPr>
+        </p:nvGraphicFramePr>
+        <p:xfrm>
+          <a:off x="467544" y="1628800"/>
+          <a:ext cx="8424936" cy="4968552"/>
+        </p:xfrm>
+        <a:graphic>
+          <a:graphicData uri="http://schemas.openxmlformats.org/drawingml/2006/chart">
+            <c:chart xmlns:c="http://schemas.openxmlformats.org/drawingml/2006/chart" xmlns:r="http://schemas.openxmlformats.org/officeDocument/2006/relationships" r:id="rId3"/>
+          </a:graphicData>
+        </a:graphic>
+      </p:graphicFrame>
     </p:spTree>
     <p:extLst>
       <p:ext uri="{BB962C8B-B14F-4D97-AF65-F5344CB8AC3E}">
-        <p14:creationId xmlns:p14="http://schemas.microsoft.com/office/powerpoint/2010/main" val="272930932"/>
+        <p14:creationId xmlns:p14="http://schemas.microsoft.com/office/powerpoint/2010/main" val="4226239434"/>
       </p:ext>
     </p:extLst>
   </p:cSld>
@@ -8626,50 +8822,35 @@
         <p:spPr/>
         <p:txBody>
           <a:bodyPr>
-            <a:normAutofit fontScale="90000"/>
+            <a:normAutofit/>
           </a:bodyPr>
           <a:lstStyle/>
           <a:p>
             <a:r>
               <a:rPr lang="es-AR" dirty="0" smtClean="0"/>
-              <a:t>Peor Caso</a:t>
-            </a:r>
-            <a:br>
-              <a:rPr lang="es-AR" dirty="0" smtClean="0"/>
-            </a:br>
-            <a:r>
-              <a:rPr lang="es-AR" sz="4000" dirty="0" smtClean="0"/>
-              <a:t>Expansión en Argentina con un 3% </a:t>
-            </a:r>
-            <a:br>
-              <a:rPr lang="es-AR" sz="4000" dirty="0" smtClean="0"/>
-            </a:br>
-            <a:r>
-              <a:rPr lang="es-AR" sz="4000" dirty="0" smtClean="0"/>
-              <a:t>del  mercado</a:t>
-            </a:r>
-            <a:endParaRPr lang="es-AR" sz="4000" dirty="0"/>
+              <a:t>Caso 2: expansión exitosa global</a:t>
+            </a:r>
+            <a:endParaRPr lang="es-AR" dirty="0"/>
           </a:p>
         </p:txBody>
       </p:sp>
       <p:graphicFrame>
         <p:nvGraphicFramePr>
-          <p:cNvPr id="4" name="Content Placeholder 3"/>
+          <p:cNvPr id="5" name="Chart 4"/>
           <p:cNvGraphicFramePr>
-            <a:graphicFrameLocks noGrp="1"/>
+            <a:graphicFrameLocks/>
           </p:cNvGraphicFramePr>
           <p:nvPr>
-            <p:ph idx="1"/>
             <p:extLst>
               <p:ext uri="{D42A27DB-BD31-4B8C-83A1-F6EECF244321}">
-                <p14:modId xmlns:p14="http://schemas.microsoft.com/office/powerpoint/2010/main" val="502134616"/>
+                <p14:modId xmlns:p14="http://schemas.microsoft.com/office/powerpoint/2010/main" val="2523089210"/>
               </p:ext>
             </p:extLst>
           </p:nvPr>
         </p:nvGraphicFramePr>
         <p:xfrm>
-          <a:off x="457200" y="1600200"/>
-          <a:ext cx="8229600" cy="4525963"/>
+          <a:off x="323528" y="1268760"/>
+          <a:ext cx="8568952" cy="5400600"/>
         </p:xfrm>
         <a:graphic>
           <a:graphicData uri="http://schemas.openxmlformats.org/drawingml/2006/chart">
@@ -8677,93 +8858,10 @@
           </a:graphicData>
         </a:graphic>
       </p:graphicFrame>
-      <p:sp>
-        <p:nvSpPr>
-          <p:cNvPr id="5" name="TextBox 4"/>
-          <p:cNvSpPr txBox="1"/>
-          <p:nvPr/>
-        </p:nvSpPr>
-        <p:spPr>
-          <a:xfrm>
-            <a:off x="251520" y="1052736"/>
-            <a:ext cx="1800200" cy="584775"/>
-          </a:xfrm>
-          <a:prstGeom prst="rect">
-            <a:avLst/>
-          </a:prstGeom>
-          <a:noFill/>
-          <a:ln>
-            <a:solidFill>
-              <a:schemeClr val="bg1"/>
-            </a:solidFill>
-          </a:ln>
-        </p:spPr>
-        <p:txBody>
-          <a:bodyPr wrap="square" rtlCol="0">
-            <a:spAutoFit/>
-          </a:bodyPr>
-          <a:lstStyle/>
-          <a:p>
-            <a:r>
-              <a:rPr lang="es-AR" sz="1600" dirty="0" err="1" smtClean="0">
-                <a:solidFill>
-                  <a:schemeClr val="tx2">
-                    <a:lumMod val="60000"/>
-                    <a:lumOff val="40000"/>
-                  </a:schemeClr>
-                </a:solidFill>
-              </a:rPr>
-              <a:t>Cant</a:t>
-            </a:r>
-            <a:r>
-              <a:rPr lang="es-AR" sz="1600" dirty="0" smtClean="0">
-                <a:solidFill>
-                  <a:schemeClr val="tx2">
-                    <a:lumMod val="60000"/>
-                    <a:lumOff val="40000"/>
-                  </a:schemeClr>
-                </a:solidFill>
-              </a:rPr>
-              <a:t> usuarios</a:t>
-            </a:r>
-            <a:br>
-              <a:rPr lang="es-AR" sz="1600" dirty="0" smtClean="0">
-                <a:solidFill>
-                  <a:schemeClr val="tx2">
-                    <a:lumMod val="60000"/>
-                    <a:lumOff val="40000"/>
-                  </a:schemeClr>
-                </a:solidFill>
-              </a:rPr>
-            </a:br>
-            <a:r>
-              <a:rPr lang="es-AR" sz="1600" dirty="0" smtClean="0"/>
-              <a:t>/</a:t>
-            </a:r>
-            <a:r>
-              <a:rPr lang="es-AR" sz="1600" dirty="0" smtClean="0">
-                <a:solidFill>
-                  <a:schemeClr val="accent2">
-                    <a:lumMod val="75000"/>
-                  </a:schemeClr>
-                </a:solidFill>
-              </a:rPr>
-              <a:t>USD</a:t>
-            </a:r>
-            <a:endParaRPr lang="es-AR" dirty="0">
-              <a:solidFill>
-                <a:schemeClr val="accent2">
-                  <a:lumMod val="75000"/>
-                </a:schemeClr>
-              </a:solidFill>
-            </a:endParaRPr>
-          </a:p>
-        </p:txBody>
-      </p:sp>
     </p:spTree>
     <p:extLst>
       <p:ext uri="{BB962C8B-B14F-4D97-AF65-F5344CB8AC3E}">
-        <p14:creationId xmlns:p14="http://schemas.microsoft.com/office/powerpoint/2010/main" val="4226239434"/>
+        <p14:creationId xmlns:p14="http://schemas.microsoft.com/office/powerpoint/2010/main" val="4186439492"/>
       </p:ext>
     </p:extLst>
   </p:cSld>
@@ -8809,48 +8907,50 @@
         </p:nvSpPr>
         <p:spPr/>
         <p:txBody>
-          <a:bodyPr>
-            <a:normAutofit/>
-          </a:bodyPr>
+          <a:bodyPr/>
           <a:lstStyle/>
           <a:p>
             <a:r>
               <a:rPr lang="es-AR" dirty="0" smtClean="0"/>
-              <a:t>Caso 2: expansión exitosa global</a:t>
+              <a:t>Publicidad</a:t>
             </a:r>
             <a:endParaRPr lang="es-AR" dirty="0"/>
           </a:p>
         </p:txBody>
       </p:sp>
-      <p:graphicFrame>
-        <p:nvGraphicFramePr>
-          <p:cNvPr id="4" name="Content Placeholder 3"/>
-          <p:cNvGraphicFramePr>
-            <a:graphicFrameLocks noGrp="1"/>
-          </p:cNvGraphicFramePr>
+      <p:pic>
+        <p:nvPicPr>
+          <p:cNvPr id="6" name="Content Placeholder 5"/>
+          <p:cNvPicPr>
+            <a:picLocks noGrp="1" noChangeAspect="1"/>
+          </p:cNvPicPr>
           <p:nvPr>
             <p:ph idx="1"/>
-            <p:extLst>
-              <p:ext uri="{D42A27DB-BD31-4B8C-83A1-F6EECF244321}">
-                <p14:modId xmlns:p14="http://schemas.microsoft.com/office/powerpoint/2010/main" val="3308615213"/>
-              </p:ext>
-            </p:extLst>
-          </p:nvPr>
-        </p:nvGraphicFramePr>
-        <p:xfrm>
-          <a:off x="457200" y="1600200"/>
-          <a:ext cx="8229600" cy="4525963"/>
-        </p:xfrm>
-        <a:graphic>
-          <a:graphicData uri="http://schemas.openxmlformats.org/drawingml/2006/chart">
-            <c:chart xmlns:c="http://schemas.openxmlformats.org/drawingml/2006/chart" xmlns:r="http://schemas.openxmlformats.org/officeDocument/2006/relationships" r:id="rId3"/>
-          </a:graphicData>
-        </a:graphic>
-      </p:graphicFrame>
+          </p:nvPr>
+        </p:nvPicPr>
+        <p:blipFill>
+          <a:blip r:embed="rId3">
+            <a:extLst>
+              <a:ext uri="{28A0092B-C50C-407E-A947-70E740481C1C}">
+                <a14:useLocalDpi xmlns:a14="http://schemas.microsoft.com/office/drawing/2010/main" val="0"/>
+              </a:ext>
+            </a:extLst>
+          </a:blip>
+          <a:stretch>
+            <a:fillRect/>
+          </a:stretch>
+        </p:blipFill>
+        <p:spPr>
+          <a:xfrm>
+            <a:off x="2564179" y="1600200"/>
+            <a:ext cx="4015641" cy="4525963"/>
+          </a:xfrm>
+        </p:spPr>
+      </p:pic>
     </p:spTree>
     <p:extLst>
       <p:ext uri="{BB962C8B-B14F-4D97-AF65-F5344CB8AC3E}">
-        <p14:creationId xmlns:p14="http://schemas.microsoft.com/office/powerpoint/2010/main" val="4186439492"/>
+        <p14:creationId xmlns:p14="http://schemas.microsoft.com/office/powerpoint/2010/main" val="272930932"/>
       </p:ext>
     </p:extLst>
   </p:cSld>

</xml_diff>

<commit_message>
cambiando un par de bobadas de la parte de ingreso/egresos
</commit_message>
<xml_diff>
--- a/Assets/Presentación negocio.pptx
+++ b/Assets/Presentación negocio.pptx
@@ -22,7 +22,7 @@
     <p:sldId id="260" r:id="rId13"/>
   </p:sldIdLst>
   <p:sldSz cx="9144000" cy="6858000" type="screen4x3"/>
-  <p:notesSz cx="6858000" cy="9144000"/>
+  <p:notesSz cx="6669088" cy="9928225"/>
   <p:defaultTextStyle>
     <a:defPPr>
       <a:defRPr lang="es-AR"/>
@@ -123,24 +123,12 @@
 
 <file path=ppt/charts/chart1.xml><?xml version="1.0" encoding="utf-8"?>
 <c:chartSpace xmlns:c="http://schemas.openxmlformats.org/drawingml/2006/chart" xmlns:a="http://schemas.openxmlformats.org/drawingml/2006/main" xmlns:r="http://schemas.openxmlformats.org/officeDocument/2006/relationships">
-  <c:date1904 val="0"/>
   <c:lang val="es-AR"/>
-  <c:roundedCorners val="0"/>
-  <mc:AlternateContent xmlns:mc="http://schemas.openxmlformats.org/markup-compatibility/2006">
-    <mc:Choice xmlns:c14="http://schemas.microsoft.com/office/drawing/2007/8/2/chart" Requires="c14">
-      <c14:style val="102"/>
-    </mc:Choice>
-    <mc:Fallback>
-      <c:style val="2"/>
-    </mc:Fallback>
-  </mc:AlternateContent>
   <c:chart>
-    <c:autoTitleDeleted val="0"/>
     <c:plotArea>
       <c:layout/>
       <c:lineChart>
         <c:grouping val="standard"/>
-        <c:varyColors val="0"/>
         <c:ser>
           <c:idx val="0"/>
           <c:order val="0"/>
@@ -199,13 +187,13 @@
                   <c:v>4803.3489504000008</c:v>
                 </c:pt>
                 <c:pt idx="14">
-                  <c:v>4827.3656951520006</c:v>
+                  <c:v>4827.3656951520015</c:v>
                 </c:pt>
                 <c:pt idx="15">
                   <c:v>5020.4603229580798</c:v>
                 </c:pt>
                 <c:pt idx="16">
-                  <c:v>5171.0741326468233</c:v>
+                  <c:v>5171.0741326468224</c:v>
                 </c:pt>
                 <c:pt idx="17">
                   <c:v>5274.4956152997593</c:v>
@@ -217,21 +205,20 @@
                   <c:v>5337.7175422771188</c:v>
                 </c:pt>
                 <c:pt idx="20">
-                  <c:v>5560.1224398719996</c:v>
+                  <c:v>5560.1224398720024</c:v>
                 </c:pt>
                 <c:pt idx="21">
-                  <c:v>5673.5943263999989</c:v>
+                  <c:v>5673.5943263999998</c:v>
                 </c:pt>
                 <c:pt idx="22">
                   <c:v>5759.99424</c:v>
                 </c:pt>
                 <c:pt idx="23">
-                  <c:v>5818.1759999999995</c:v>
+                  <c:v>5818.1760000000004</c:v>
                 </c:pt>
               </c:numCache>
             </c:numRef>
           </c:val>
-          <c:smooth val="0"/>
         </c:ser>
         <c:ser>
           <c:idx val="1"/>
@@ -288,7 +275,7 @@
                   <c:v>5721.3340800000005</c:v>
                 </c:pt>
                 <c:pt idx="13">
-                  <c:v>5778.5474208000023</c:v>
+                  <c:v>5778.5474208000014</c:v>
                 </c:pt>
                 <c:pt idx="14">
                   <c:v>5742.1133579039997</c:v>
@@ -303,16 +290,16 @@
                   <c:v>6486.0044120913008</c:v>
                 </c:pt>
                 <c:pt idx="18">
-                  <c:v>6822.6470206256563</c:v>
+                  <c:v>6822.6470206256572</c:v>
                 </c:pt>
                 <c:pt idx="19">
-                  <c:v>6015.1927654202582</c:v>
+                  <c:v>6015.1927654202591</c:v>
                 </c:pt>
                 <c:pt idx="20">
                   <c:v>7148.7288512640025</c:v>
                 </c:pt>
                 <c:pt idx="21">
-                  <c:v>6982.8853247999987</c:v>
+                  <c:v>6982.8853248000005</c:v>
                 </c:pt>
                 <c:pt idx="22">
                   <c:v>7010.1028800000022</c:v>
@@ -323,7 +310,6 @@
               </c:numCache>
             </c:numRef>
           </c:val>
-          <c:smooth val="0"/>
         </c:ser>
         <c:ser>
           <c:idx val="2"/>
@@ -374,16 +360,16 @@
                   <c:v>1176</c:v>
                 </c:pt>
                 <c:pt idx="11">
-                  <c:v>1293.6000000000001</c:v>
+                  <c:v>1293.5999999999999</c:v>
                 </c:pt>
                 <c:pt idx="12">
                   <c:v>1306.5360000000003</c:v>
                 </c:pt>
                 <c:pt idx="13">
-                  <c:v>1319.6013600000003</c:v>
+                  <c:v>1319.6013600000001</c:v>
                 </c:pt>
                 <c:pt idx="14">
-                  <c:v>1326.1993668000002</c:v>
+                  <c:v>1326.1993668</c:v>
                 </c:pt>
                 <c:pt idx="15">
                   <c:v>1379.247341472</c:v>
@@ -395,10 +381,10 @@
                   <c:v>1449.0372569504834</c:v>
                 </c:pt>
                 <c:pt idx="18">
-                  <c:v>1492.508374658998</c:v>
+                  <c:v>1492.5083746589978</c:v>
                 </c:pt>
                 <c:pt idx="19">
-                  <c:v>1466.4059182079998</c:v>
+                  <c:v>1466.405918208</c:v>
                 </c:pt>
                 <c:pt idx="20">
                   <c:v>1527.5061648000001</c:v>
@@ -407,7 +393,7 @@
                   <c:v>1558.67976</c:v>
                 </c:pt>
                 <c:pt idx="22">
-                  <c:v>1582.4160000000002</c:v>
+                  <c:v>1582.4160000000004</c:v>
                 </c:pt>
                 <c:pt idx="23">
                   <c:v>1598.4</c:v>
@@ -415,51 +401,35 @@
               </c:numCache>
             </c:numRef>
           </c:val>
-          <c:smooth val="0"/>
         </c:ser>
-        <c:dLbls>
-          <c:showLegendKey val="0"/>
-          <c:showVal val="0"/>
-          <c:showCatName val="0"/>
-          <c:showSerName val="0"/>
-          <c:showPercent val="0"/>
-          <c:showBubbleSize val="0"/>
-        </c:dLbls>
+        <c:dLbls/>
         <c:marker val="1"/>
-        <c:smooth val="0"/>
-        <c:axId val="76215040"/>
-        <c:axId val="76216576"/>
+        <c:axId val="65404928"/>
+        <c:axId val="65406464"/>
       </c:lineChart>
       <c:catAx>
-        <c:axId val="76215040"/>
+        <c:axId val="65404928"/>
         <c:scaling>
           <c:orientation val="minMax"/>
         </c:scaling>
-        <c:delete val="0"/>
         <c:axPos val="b"/>
-        <c:majorTickMark val="out"/>
-        <c:minorTickMark val="none"/>
         <c:tickLblPos val="nextTo"/>
-        <c:crossAx val="76216576"/>
+        <c:crossAx val="65406464"/>
         <c:crosses val="autoZero"/>
         <c:auto val="1"/>
         <c:lblAlgn val="ctr"/>
         <c:lblOffset val="100"/>
-        <c:noMultiLvlLbl val="0"/>
       </c:catAx>
       <c:valAx>
-        <c:axId val="76216576"/>
+        <c:axId val="65406464"/>
         <c:scaling>
           <c:orientation val="minMax"/>
         </c:scaling>
-        <c:delete val="0"/>
         <c:axPos val="l"/>
         <c:majorGridlines/>
         <c:numFmt formatCode="0" sourceLinked="1"/>
-        <c:majorTickMark val="out"/>
-        <c:minorTickMark val="none"/>
         <c:tickLblPos val="nextTo"/>
-        <c:crossAx val="76215040"/>
+        <c:crossAx val="65404928"/>
         <c:crosses val="autoZero"/>
         <c:crossBetween val="between"/>
       </c:valAx>
@@ -467,7 +437,6 @@
     <c:legend>
       <c:legendPos val="b"/>
       <c:layout/>
-      <c:overlay val="0"/>
       <c:txPr>
         <a:bodyPr/>
         <a:lstStyle/>
@@ -481,44 +450,29 @@
     </c:legend>
     <c:plotVisOnly val="1"/>
     <c:dispBlanksAs val="gap"/>
-    <c:showDLblsOverMax val="0"/>
   </c:chart>
-  <c:externalData r:id="rId1">
-    <c:autoUpdate val="0"/>
-  </c:externalData>
+  <c:externalData r:id="rId1"/>
 </c:chartSpace>
 </file>
 
 <file path=ppt/charts/chart2.xml><?xml version="1.0" encoding="utf-8"?>
 <c:chartSpace xmlns:c="http://schemas.openxmlformats.org/drawingml/2006/chart" xmlns:a="http://schemas.openxmlformats.org/drawingml/2006/main" xmlns:r="http://schemas.openxmlformats.org/officeDocument/2006/relationships">
-  <c:date1904 val="0"/>
   <c:lang val="es-AR"/>
-  <c:roundedCorners val="0"/>
-  <mc:AlternateContent xmlns:mc="http://schemas.openxmlformats.org/markup-compatibility/2006">
-    <mc:Choice xmlns:c14="http://schemas.microsoft.com/office/drawing/2007/8/2/chart" Requires="c14">
-      <c14:style val="102"/>
-    </mc:Choice>
-    <mc:Fallback>
-      <c:style val="2"/>
-    </mc:Fallback>
-  </mc:AlternateContent>
   <c:chart>
-    <c:autoTitleDeleted val="0"/>
     <c:plotArea>
       <c:layout>
         <c:manualLayout>
           <c:layoutTarget val="inner"/>
           <c:xMode val="edge"/>
           <c:yMode val="edge"/>
-          <c:x val="6.7896043958078731E-2"/>
+          <c:x val="6.7896043958078744E-2"/>
           <c:y val="2.71964380500932E-2"/>
-          <c:w val="0.91593677091434289"/>
-          <c:h val="0.80538177085262119"/>
+          <c:w val="0.91593677091434278"/>
+          <c:h val="0.80538177085262108"/>
         </c:manualLayout>
       </c:layout>
       <c:lineChart>
         <c:grouping val="standard"/>
-        <c:varyColors val="0"/>
         <c:ser>
           <c:idx val="0"/>
           <c:order val="0"/>
@@ -558,19 +512,19 @@
                   <c:v>3211.7647058823532</c:v>
                 </c:pt>
                 <c:pt idx="5">
-                  <c:v>4068.2352941176464</c:v>
+                  <c:v>4068.2352941176459</c:v>
                 </c:pt>
                 <c:pt idx="6">
-                  <c:v>5138.823529411764</c:v>
+                  <c:v>5138.8235294117658</c:v>
                 </c:pt>
                 <c:pt idx="7">
-                  <c:v>6423.5294117647063</c:v>
+                  <c:v>6423.5294117647072</c:v>
                 </c:pt>
                 <c:pt idx="8">
-                  <c:v>7494.1176470588225</c:v>
+                  <c:v>7494.1176470588234</c:v>
                 </c:pt>
                 <c:pt idx="9">
-                  <c:v>8564.7058823529405</c:v>
+                  <c:v>8564.7058823529424</c:v>
                 </c:pt>
                 <c:pt idx="10">
                   <c:v>18200</c:v>
@@ -617,7 +571,6 @@
               </c:numCache>
             </c:numRef>
           </c:val>
-          <c:smooth val="0"/>
         </c:ser>
         <c:ser>
           <c:idx val="1"/>
@@ -652,13 +605,13 @@
                   <c:v>3358.8235294117649</c:v>
                 </c:pt>
                 <c:pt idx="3">
-                  <c:v>3988.2352941176468</c:v>
+                  <c:v>3988.2352941176464</c:v>
                 </c:pt>
                 <c:pt idx="4">
                   <c:v>5835.2941176470595</c:v>
                 </c:pt>
                 <c:pt idx="5">
-                  <c:v>7136.4705882352937</c:v>
+                  <c:v>7136.4705882352928</c:v>
                 </c:pt>
                 <c:pt idx="6">
                   <c:v>8983.5294117647063</c:v>
@@ -670,10 +623,10 @@
                   <c:v>11752.941176470587</c:v>
                 </c:pt>
                 <c:pt idx="9">
-                  <c:v>13011.764705882353</c:v>
+                  <c:v>13011.764705882355</c:v>
                 </c:pt>
                 <c:pt idx="10">
-                  <c:v>47870.588235294126</c:v>
+                  <c:v>47870.588235294148</c:v>
                 </c:pt>
                 <c:pt idx="11">
                   <c:v>57100</c:v>
@@ -717,7 +670,6 @@
               </c:numCache>
             </c:numRef>
           </c:val>
-          <c:smooth val="0"/>
         </c:ser>
         <c:ser>
           <c:idx val="2"/>
@@ -746,16 +698,16 @@
                   <c:v>200</c:v>
                 </c:pt>
                 <c:pt idx="1">
-                  <c:v>294.11764705882354</c:v>
+                  <c:v>294.11764705882359</c:v>
                 </c:pt>
                 <c:pt idx="2">
-                  <c:v>441.1764705882353</c:v>
+                  <c:v>441.17647058823525</c:v>
                 </c:pt>
                 <c:pt idx="3">
-                  <c:v>588.23529411764707</c:v>
+                  <c:v>588.23529411764719</c:v>
                 </c:pt>
                 <c:pt idx="4">
-                  <c:v>882.35294117647061</c:v>
+                  <c:v>882.35294117647049</c:v>
                 </c:pt>
                 <c:pt idx="5">
                   <c:v>1117.6470588235293</c:v>
@@ -770,7 +722,7 @@
                   <c:v>2058.8235294117649</c:v>
                 </c:pt>
                 <c:pt idx="9">
-                  <c:v>2352.9411764705883</c:v>
+                  <c:v>2352.9411764705897</c:v>
                 </c:pt>
                 <c:pt idx="10">
                   <c:v>5000</c:v>
@@ -817,51 +769,35 @@
               </c:numCache>
             </c:numRef>
           </c:val>
-          <c:smooth val="0"/>
         </c:ser>
-        <c:dLbls>
-          <c:showLegendKey val="0"/>
-          <c:showVal val="0"/>
-          <c:showCatName val="0"/>
-          <c:showSerName val="0"/>
-          <c:showPercent val="0"/>
-          <c:showBubbleSize val="0"/>
-        </c:dLbls>
+        <c:dLbls/>
         <c:marker val="1"/>
-        <c:smooth val="0"/>
-        <c:axId val="78349824"/>
-        <c:axId val="78351360"/>
+        <c:axId val="65490304"/>
+        <c:axId val="65496192"/>
       </c:lineChart>
       <c:catAx>
-        <c:axId val="78349824"/>
+        <c:axId val="65490304"/>
         <c:scaling>
           <c:orientation val="minMax"/>
         </c:scaling>
-        <c:delete val="0"/>
         <c:axPos val="b"/>
-        <c:majorTickMark val="out"/>
-        <c:minorTickMark val="none"/>
         <c:tickLblPos val="nextTo"/>
-        <c:crossAx val="78351360"/>
+        <c:crossAx val="65496192"/>
         <c:crosses val="autoZero"/>
         <c:auto val="1"/>
         <c:lblAlgn val="ctr"/>
         <c:lblOffset val="100"/>
-        <c:noMultiLvlLbl val="0"/>
       </c:catAx>
       <c:valAx>
-        <c:axId val="78351360"/>
+        <c:axId val="65496192"/>
         <c:scaling>
           <c:orientation val="minMax"/>
         </c:scaling>
-        <c:delete val="0"/>
         <c:axPos val="l"/>
         <c:majorGridlines/>
         <c:numFmt formatCode="0" sourceLinked="1"/>
-        <c:majorTickMark val="out"/>
-        <c:minorTickMark val="none"/>
         <c:tickLblPos val="nextTo"/>
-        <c:crossAx val="78349824"/>
+        <c:crossAx val="65490304"/>
         <c:crosses val="autoZero"/>
         <c:crossBetween val="between"/>
       </c:valAx>
@@ -872,13 +808,12 @@
         <c:manualLayout>
           <c:xMode val="edge"/>
           <c:yMode val="edge"/>
-          <c:x val="3.1027121609798768E-2"/>
-          <c:y val="0.88968702551568346"/>
+          <c:x val="3.1027121609798772E-2"/>
+          <c:y val="0.88968702551568357"/>
           <c:w val="0.93239020122484695"/>
-          <c:h val="8.2535196706538763E-2"/>
+          <c:h val="8.2535196706538749E-2"/>
         </c:manualLayout>
       </c:layout>
-      <c:overlay val="0"/>
       <c:txPr>
         <a:bodyPr/>
         <a:lstStyle/>
@@ -892,11 +827,8 @@
     </c:legend>
     <c:plotVisOnly val="1"/>
     <c:dispBlanksAs val="gap"/>
-    <c:showDLblsOverMax val="0"/>
   </c:chart>
-  <c:externalData r:id="rId1">
-    <c:autoUpdate val="0"/>
-  </c:externalData>
+  <c:externalData r:id="rId1"/>
 </c:chartSpace>
 </file>
 
@@ -935,7 +867,7 @@
         <p:spPr>
           <a:xfrm>
             <a:off x="0" y="0"/>
-            <a:ext cx="2971800" cy="457200"/>
+            <a:ext cx="2889938" cy="496411"/>
           </a:xfrm>
           <a:prstGeom prst="rect">
             <a:avLst/>
@@ -965,8 +897,8 @@
         </p:nvSpPr>
         <p:spPr>
           <a:xfrm>
-            <a:off x="3884613" y="0"/>
-            <a:ext cx="2971800" cy="457200"/>
+            <a:off x="3777607" y="0"/>
+            <a:ext cx="2889938" cy="496411"/>
           </a:xfrm>
           <a:prstGeom prst="rect">
             <a:avLst/>
@@ -983,7 +915,7 @@
             <a:fld id="{F5423D00-7DDB-4217-941A-91DA7862F42C}" type="datetimeFigureOut">
               <a:rPr lang="es-AR" smtClean="0"/>
               <a:pPr/>
-              <a:t>04/08/2013</a:t>
+              <a:t>06/08/2013</a:t>
             </a:fld>
             <a:endParaRPr lang="es-AR"/>
           </a:p>
@@ -1001,8 +933,8 @@
         </p:nvSpPr>
         <p:spPr>
           <a:xfrm>
-            <a:off x="1143000" y="685800"/>
-            <a:ext cx="4572000" cy="3429000"/>
+            <a:off x="854075" y="744538"/>
+            <a:ext cx="4960938" cy="3722687"/>
           </a:xfrm>
           <a:prstGeom prst="rect">
             <a:avLst/>
@@ -1034,8 +966,8 @@
         </p:nvSpPr>
         <p:spPr>
           <a:xfrm>
-            <a:off x="685800" y="4343400"/>
-            <a:ext cx="5486400" cy="4114800"/>
+            <a:off x="666909" y="4715907"/>
+            <a:ext cx="5335270" cy="4467701"/>
           </a:xfrm>
           <a:prstGeom prst="rect">
             <a:avLst/>
@@ -1094,8 +1026,8 @@
         </p:nvSpPr>
         <p:spPr>
           <a:xfrm>
-            <a:off x="0" y="8685213"/>
-            <a:ext cx="2971800" cy="457200"/>
+            <a:off x="0" y="9430091"/>
+            <a:ext cx="2889938" cy="496411"/>
           </a:xfrm>
           <a:prstGeom prst="rect">
             <a:avLst/>
@@ -1125,8 +1057,8 @@
         </p:nvSpPr>
         <p:spPr>
           <a:xfrm>
-            <a:off x="3884613" y="8685213"/>
-            <a:ext cx="2971800" cy="457200"/>
+            <a:off x="3777607" y="9430091"/>
+            <a:ext cx="2889938" cy="496411"/>
           </a:xfrm>
           <a:prstGeom prst="rect">
             <a:avLst/>
@@ -1152,7 +1084,7 @@
     </p:spTree>
     <p:extLst>
       <p:ext uri="{BB962C8B-B14F-4D97-AF65-F5344CB8AC3E}">
-        <p14:creationId xmlns:p14="http://schemas.microsoft.com/office/powerpoint/2010/main" val="2280170094"/>
+        <p14:creationId xmlns:p14="http://schemas.microsoft.com/office/powerpoint/2010/main" xmlns="" val="2280170094"/>
       </p:ext>
     </p:extLst>
   </p:cSld>
@@ -1341,7 +1273,7 @@
     </p:spTree>
     <p:extLst>
       <p:ext uri="{BB962C8B-B14F-4D97-AF65-F5344CB8AC3E}">
-        <p14:creationId xmlns:p14="http://schemas.microsoft.com/office/powerpoint/2010/main" val="452615974"/>
+        <p14:creationId xmlns:p14="http://schemas.microsoft.com/office/powerpoint/2010/main" xmlns="" val="452615974"/>
       </p:ext>
     </p:extLst>
   </p:cSld>
@@ -1621,7 +1553,78 @@
                 <a:ea typeface="+mn-ea"/>
                 <a:cs typeface="+mn-cs"/>
               </a:rPr>
-              <a:t>En lo referente a ingresos, las mismas serían al </a:t>
+              <a:t>En lo referente a ingresos, </a:t>
+            </a:r>
+            <a:r>
+              <a:rPr lang="es-AR" sz="1200" b="0" i="0" kern="1200" baseline="0" dirty="0" smtClean="0">
+                <a:solidFill>
+                  <a:schemeClr val="tx1"/>
+                </a:solidFill>
+                <a:effectLst/>
+                <a:latin typeface="+mn-lt"/>
+                <a:ea typeface="+mn-ea"/>
+                <a:cs typeface="+mn-cs"/>
+              </a:rPr>
+              <a:t>los mismos </a:t>
+            </a:r>
+            <a:r>
+              <a:rPr lang="es-AR" sz="1200" b="0" i="0" kern="1200" baseline="0" dirty="0" smtClean="0">
+                <a:solidFill>
+                  <a:schemeClr val="tx1"/>
+                </a:solidFill>
+                <a:effectLst/>
+                <a:latin typeface="+mn-lt"/>
+                <a:ea typeface="+mn-ea"/>
+                <a:cs typeface="+mn-cs"/>
+              </a:rPr>
+              <a:t>serían al </a:t>
+            </a:r>
+            <a:r>
+              <a:rPr lang="es-AR" sz="1200" b="0" i="0" kern="1200" baseline="0" dirty="0" smtClean="0">
+                <a:solidFill>
+                  <a:schemeClr val="tx1"/>
+                </a:solidFill>
+                <a:effectLst/>
+                <a:latin typeface="+mn-lt"/>
+                <a:ea typeface="+mn-ea"/>
+                <a:cs typeface="+mn-cs"/>
+              </a:rPr>
+              <a:t>alcanzar </a:t>
+            </a:r>
+            <a:r>
+              <a:rPr lang="es-AR" sz="1200" b="0" i="0" kern="1200" baseline="0" dirty="0" smtClean="0">
+                <a:solidFill>
+                  <a:schemeClr val="tx1"/>
+                </a:solidFill>
+                <a:effectLst/>
+                <a:latin typeface="+mn-lt"/>
+                <a:ea typeface="+mn-ea"/>
+                <a:cs typeface="+mn-cs"/>
+              </a:rPr>
+              <a:t>los 2 años de entre los 270k a 400k al mes, teniendo en cuenta los mismos precios para las publicidades que en el escenario anterior. </a:t>
+            </a:r>
+            <a:endParaRPr lang="es-AR" sz="1200" b="0" i="0" kern="1200" baseline="0" dirty="0" smtClean="0">
+              <a:solidFill>
+                <a:schemeClr val="tx1"/>
+              </a:solidFill>
+              <a:effectLst/>
+              <a:latin typeface="+mn-lt"/>
+              <a:ea typeface="+mn-ea"/>
+              <a:cs typeface="+mn-cs"/>
+            </a:endParaRPr>
+          </a:p>
+          <a:p>
+            <a:r>
+              <a:rPr lang="es-AR" sz="1200" b="0" i="0" kern="1200" baseline="0" dirty="0" smtClean="0">
+                <a:solidFill>
+                  <a:schemeClr val="tx1"/>
+                </a:solidFill>
+                <a:effectLst/>
+                <a:latin typeface="+mn-lt"/>
+                <a:ea typeface="+mn-ea"/>
+                <a:cs typeface="+mn-cs"/>
+              </a:rPr>
+              <a:t>EN lo referente a los gastos, los mismos serían proporcionalmente algo más elevados (entre el 21%-23%) ya que es necesario contar con un grupo de desarrolladores para mantener la actualización de la aplicación. Esto nos </a:t>
             </a:r>
             <a:r>
               <a:rPr lang="es-AR" sz="1200" b="0" i="0" kern="1200" baseline="0" dirty="0" err="1" smtClean="0">
@@ -1633,7 +1636,7 @@
                 <a:ea typeface="+mn-ea"/>
                 <a:cs typeface="+mn-cs"/>
               </a:rPr>
-              <a:t>alzancar</a:t>
+              <a:t>daria</a:t>
             </a:r>
             <a:r>
               <a:rPr lang="es-AR" sz="1200" b="0" i="0" kern="1200" baseline="0" dirty="0" smtClean="0">
@@ -1645,8 +1648,65 @@
                 <a:ea typeface="+mn-ea"/>
                 <a:cs typeface="+mn-cs"/>
               </a:rPr>
-              <a:t> los 2 años de entre los 270k a 400k al mes, teniendo en cuenta los mismos precios para las publicidades que en el escenario anterior. Como pueden ver, un gran negocio.</a:t>
-            </a:r>
+              <a:t> unas </a:t>
+            </a:r>
+            <a:r>
+              <a:rPr lang="es-AR" sz="1200" b="0" i="0" kern="1200" baseline="0" dirty="0" err="1" smtClean="0">
+                <a:solidFill>
+                  <a:schemeClr val="tx1"/>
+                </a:solidFill>
+                <a:effectLst/>
+                <a:latin typeface="+mn-lt"/>
+                <a:ea typeface="+mn-ea"/>
+                <a:cs typeface="+mn-cs"/>
+              </a:rPr>
+              <a:t>ganacias</a:t>
+            </a:r>
+            <a:r>
+              <a:rPr lang="es-AR" sz="1200" b="0" i="0" kern="1200" baseline="0" dirty="0" smtClean="0">
+                <a:solidFill>
+                  <a:schemeClr val="tx1"/>
+                </a:solidFill>
+                <a:effectLst/>
+                <a:latin typeface="+mn-lt"/>
+                <a:ea typeface="+mn-ea"/>
+                <a:cs typeface="+mn-cs"/>
+              </a:rPr>
+              <a:t> de aproximadamente 200 a 300k. Como </a:t>
+            </a:r>
+            <a:r>
+              <a:rPr lang="es-AR" sz="1200" b="0" i="0" kern="1200" baseline="0" dirty="0" smtClean="0">
+                <a:solidFill>
+                  <a:schemeClr val="tx1"/>
+                </a:solidFill>
+                <a:effectLst/>
+                <a:latin typeface="+mn-lt"/>
+                <a:ea typeface="+mn-ea"/>
+                <a:cs typeface="+mn-cs"/>
+              </a:rPr>
+              <a:t>pueden ver, un gran negocio</a:t>
+            </a:r>
+            <a:r>
+              <a:rPr lang="es-AR" sz="1200" b="0" i="0" kern="1200" baseline="0" dirty="0" smtClean="0">
+                <a:solidFill>
+                  <a:schemeClr val="tx1"/>
+                </a:solidFill>
+                <a:effectLst/>
+                <a:latin typeface="+mn-lt"/>
+                <a:ea typeface="+mn-ea"/>
+                <a:cs typeface="+mn-cs"/>
+              </a:rPr>
+              <a:t>. </a:t>
+            </a:r>
+            <a:endParaRPr lang="es-AR" sz="1200" b="0" i="0" kern="1200" baseline="0" dirty="0" smtClean="0">
+              <a:solidFill>
+                <a:schemeClr val="tx1"/>
+              </a:solidFill>
+              <a:effectLst/>
+              <a:latin typeface="+mn-lt"/>
+              <a:ea typeface="+mn-ea"/>
+              <a:cs typeface="+mn-cs"/>
+            </a:endParaRPr>
           </a:p>
           <a:p>
             <a:r>
@@ -1777,7 +1837,7 @@
     </p:spTree>
     <p:extLst>
       <p:ext uri="{BB962C8B-B14F-4D97-AF65-F5344CB8AC3E}">
-        <p14:creationId xmlns:p14="http://schemas.microsoft.com/office/powerpoint/2010/main" val="3000085410"/>
+        <p14:creationId xmlns:p14="http://schemas.microsoft.com/office/powerpoint/2010/main" xmlns="" val="3000085410"/>
       </p:ext>
     </p:extLst>
   </p:cSld>
@@ -3211,7 +3271,7 @@
     </p:spTree>
     <p:extLst>
       <p:ext uri="{BB962C8B-B14F-4D97-AF65-F5344CB8AC3E}">
-        <p14:creationId xmlns:p14="http://schemas.microsoft.com/office/powerpoint/2010/main" val="2610191261"/>
+        <p14:creationId xmlns:p14="http://schemas.microsoft.com/office/powerpoint/2010/main" xmlns="" val="2610191261"/>
       </p:ext>
     </p:extLst>
   </p:cSld>
@@ -3472,7 +3532,7 @@
     </p:spTree>
     <p:extLst>
       <p:ext uri="{BB962C8B-B14F-4D97-AF65-F5344CB8AC3E}">
-        <p14:creationId xmlns:p14="http://schemas.microsoft.com/office/powerpoint/2010/main" val="1052945588"/>
+        <p14:creationId xmlns:p14="http://schemas.microsoft.com/office/powerpoint/2010/main" xmlns="" val="1052945588"/>
       </p:ext>
     </p:extLst>
   </p:cSld>
@@ -4012,7 +4072,7 @@
     </p:spTree>
     <p:extLst>
       <p:ext uri="{BB962C8B-B14F-4D97-AF65-F5344CB8AC3E}">
-        <p14:creationId xmlns:p14="http://schemas.microsoft.com/office/powerpoint/2010/main" val="84732664"/>
+        <p14:creationId xmlns:p14="http://schemas.microsoft.com/office/powerpoint/2010/main" xmlns="" val="84732664"/>
       </p:ext>
     </p:extLst>
   </p:cSld>
@@ -4267,7 +4327,7 @@
     </p:spTree>
     <p:extLst>
       <p:ext uri="{BB962C8B-B14F-4D97-AF65-F5344CB8AC3E}">
-        <p14:creationId xmlns:p14="http://schemas.microsoft.com/office/powerpoint/2010/main" val="3325332095"/>
+        <p14:creationId xmlns:p14="http://schemas.microsoft.com/office/powerpoint/2010/main" xmlns="" val="3325332095"/>
       </p:ext>
     </p:extLst>
   </p:cSld>
@@ -4323,19 +4383,7 @@
           <a:p>
             <a:r>
               <a:rPr lang="es-AR" dirty="0" smtClean="0"/>
-              <a:t>La aplicación que </a:t>
-            </a:r>
-            <a:r>
-              <a:rPr lang="es-AR" dirty="0" smtClean="0"/>
-              <a:t>proponemos </a:t>
-            </a:r>
-            <a:r>
-              <a:rPr lang="es-AR" dirty="0" smtClean="0"/>
-              <a:t>permite contar con todas estas prestaciones que mostramos</a:t>
-            </a:r>
-            <a:r>
-              <a:rPr lang="es-AR" dirty="0" smtClean="0"/>
-              <a:t>.</a:t>
+              <a:t>La aplicación que proponemos permite contar con todas estas prestaciones que mostramos.</a:t>
             </a:r>
           </a:p>
           <a:p>
@@ -4418,7 +4466,7 @@
     </p:spTree>
     <p:extLst>
       <p:ext uri="{BB962C8B-B14F-4D97-AF65-F5344CB8AC3E}">
-        <p14:creationId xmlns:p14="http://schemas.microsoft.com/office/powerpoint/2010/main" val="685780543"/>
+        <p14:creationId xmlns:p14="http://schemas.microsoft.com/office/powerpoint/2010/main" xmlns="" val="685780543"/>
       </p:ext>
     </p:extLst>
   </p:cSld>
@@ -4535,7 +4583,7 @@
     </p:spTree>
     <p:extLst>
       <p:ext uri="{BB962C8B-B14F-4D97-AF65-F5344CB8AC3E}">
-        <p14:creationId xmlns:p14="http://schemas.microsoft.com/office/powerpoint/2010/main" val="448154425"/>
+        <p14:creationId xmlns:p14="http://schemas.microsoft.com/office/powerpoint/2010/main" xmlns="" val="448154425"/>
       </p:ext>
     </p:extLst>
   </p:cSld>
@@ -4601,7 +4649,11 @@
           <a:p>
             <a:r>
               <a:rPr lang="es-AR" baseline="0" dirty="0" smtClean="0"/>
-              <a:t>La publicidad embebida en la aplicación genera ingresos tanto por cantidad de </a:t>
+              <a:t>La publicidad embebida en la aplicación genera ingresos tanto </a:t>
+            </a:r>
+            <a:r>
+              <a:rPr lang="es-AR" baseline="0" dirty="0" smtClean="0"/>
+              <a:t>por cantidad de </a:t>
             </a:r>
             <a:r>
               <a:rPr lang="es-AR" baseline="0" dirty="0" err="1" smtClean="0"/>
@@ -4609,7 +4661,11 @@
             </a:r>
             <a:r>
               <a:rPr lang="es-AR" baseline="0" dirty="0" smtClean="0"/>
-              <a:t>, es decir cada vez que un usuario accede a la aplicación, como por cantidad de </a:t>
+              <a:t>, </a:t>
+            </a:r>
+            <a:r>
+              <a:rPr lang="es-AR" baseline="0" dirty="0" smtClean="0"/>
+              <a:t>es decir cada vez que un usuario accede a la aplicación, como por cantidad de </a:t>
             </a:r>
             <a:r>
               <a:rPr lang="es-AR" baseline="0" dirty="0" err="1" smtClean="0"/>
@@ -4631,8 +4687,128 @@
             </a:r>
             <a:r>
               <a:rPr lang="es-AR" baseline="0" dirty="0" smtClean="0"/>
-              <a:t> del negocio, teniendo en cuenta este ingreso inmediato.</a:t>
-            </a:r>
+              <a:t> del negocio, teniendo en cuenta este ingreso inmediato</a:t>
+            </a:r>
+            <a:r>
+              <a:rPr lang="es-AR" baseline="0" dirty="0" smtClean="0"/>
+              <a:t>.</a:t>
+            </a:r>
+          </a:p>
+          <a:p>
+            <a:pPr marL="0" marR="0" indent="0" algn="l" defTabSz="914400" rtl="0" eaLnBrk="1" fontAlgn="auto" latinLnBrk="0" hangingPunct="1">
+              <a:lnSpc>
+                <a:spcPct val="100000"/>
+              </a:lnSpc>
+              <a:spcBef>
+                <a:spcPts val="0"/>
+              </a:spcBef>
+              <a:spcAft>
+                <a:spcPts val="0"/>
+              </a:spcAft>
+              <a:buClrTx/>
+              <a:buSzTx/>
+              <a:buFontTx/>
+              <a:buNone/>
+              <a:tabLst/>
+              <a:defRPr/>
+            </a:pPr>
+            <a:endParaRPr lang="es-AR" baseline="0" dirty="0" smtClean="0"/>
+          </a:p>
+          <a:p>
+            <a:pPr marL="0" marR="0" indent="0" algn="l" defTabSz="914400" rtl="0" eaLnBrk="1" fontAlgn="auto" latinLnBrk="0" hangingPunct="1">
+              <a:lnSpc>
+                <a:spcPct val="100000"/>
+              </a:lnSpc>
+              <a:spcBef>
+                <a:spcPts val="0"/>
+              </a:spcBef>
+              <a:spcAft>
+                <a:spcPts val="0"/>
+              </a:spcAft>
+              <a:buClrTx/>
+              <a:buSzTx/>
+              <a:buFontTx/>
+              <a:buNone/>
+              <a:tabLst/>
+              <a:defRPr/>
+            </a:pPr>
+            <a:r>
+              <a:rPr lang="es-AR" baseline="0" dirty="0" smtClean="0"/>
+              <a:t>Para los escenarios que mostraremos a continuación se ha tenido en cuenta ingresos provenientes de la publicidad y de la </a:t>
+            </a:r>
+            <a:r>
+              <a:rPr lang="es-AR" baseline="0" dirty="0" err="1" smtClean="0"/>
+              <a:t>version</a:t>
+            </a:r>
+            <a:r>
+              <a:rPr lang="es-AR" baseline="0" dirty="0" smtClean="0"/>
+              <a:t> paga:</a:t>
+            </a:r>
+          </a:p>
+          <a:p>
+            <a:pPr marL="0" marR="0" indent="0" algn="l" defTabSz="914400" rtl="0" eaLnBrk="1" fontAlgn="auto" latinLnBrk="0" hangingPunct="1">
+              <a:lnSpc>
+                <a:spcPct val="100000"/>
+              </a:lnSpc>
+              <a:spcBef>
+                <a:spcPts val="0"/>
+              </a:spcBef>
+              <a:spcAft>
+                <a:spcPts val="0"/>
+              </a:spcAft>
+              <a:buClrTx/>
+              <a:buSzTx/>
+              <a:buFontTx/>
+              <a:buNone/>
+              <a:tabLst/>
+              <a:defRPr/>
+            </a:pPr>
+            <a:r>
+              <a:rPr lang="es-AR" baseline="0" dirty="0" smtClean="0"/>
+              <a:t>la descarga de aplicación a 1 dólar (para la versión paga) los ingresos por </a:t>
+            </a:r>
+            <a:r>
+              <a:rPr lang="es-AR" baseline="0" dirty="0" err="1" smtClean="0"/>
+              <a:t>google</a:t>
+            </a:r>
+            <a:r>
+              <a:rPr lang="es-AR" baseline="0" dirty="0" smtClean="0"/>
+              <a:t> </a:t>
+            </a:r>
+            <a:r>
+              <a:rPr lang="es-AR" baseline="0" dirty="0" err="1" smtClean="0"/>
+              <a:t>Adds</a:t>
+            </a:r>
+            <a:r>
+              <a:rPr lang="es-AR" baseline="0" dirty="0" smtClean="0"/>
+              <a:t> en base a la cantidad de vistas y </a:t>
+            </a:r>
+            <a:r>
+              <a:rPr lang="es-AR" baseline="0" dirty="0" err="1" smtClean="0"/>
+              <a:t>clicks</a:t>
+            </a:r>
+            <a:r>
+              <a:rPr lang="es-AR" baseline="0" dirty="0" smtClean="0"/>
+              <a:t>. Para esto último se ha considerado los valores más bajos del mercado, es decir, tan solo 15 (15-30)  centavos por </a:t>
+            </a:r>
+            <a:r>
+              <a:rPr lang="es-AR" baseline="0" dirty="0" err="1" smtClean="0"/>
+              <a:t>clicks</a:t>
+            </a:r>
+            <a:r>
+              <a:rPr lang="es-AR" baseline="0" dirty="0" smtClean="0"/>
+              <a:t>, una probabilidad de </a:t>
+            </a:r>
+            <a:r>
+              <a:rPr lang="es-AR" baseline="0" dirty="0" err="1" smtClean="0"/>
+              <a:t>click</a:t>
+            </a:r>
+            <a:r>
+              <a:rPr lang="es-AR" baseline="0" dirty="0" smtClean="0"/>
+              <a:t> de 1,5% (1,5%-2,5%)  y 10 centavo por cada mil vistas.</a:t>
+            </a:r>
+          </a:p>
+          <a:p>
             <a:endParaRPr lang="es-AR" dirty="0"/>
           </a:p>
         </p:txBody>
@@ -4664,7 +4840,7 @@
     </p:spTree>
     <p:extLst>
       <p:ext uri="{BB962C8B-B14F-4D97-AF65-F5344CB8AC3E}">
-        <p14:creationId xmlns:p14="http://schemas.microsoft.com/office/powerpoint/2010/main" val="1057133531"/>
+        <p14:creationId xmlns:p14="http://schemas.microsoft.com/office/powerpoint/2010/main" xmlns="" val="1057133531"/>
       </p:ext>
     </p:extLst>
   </p:cSld>
@@ -4766,61 +4942,38 @@
             </a:r>
           </a:p>
           <a:p>
-            <a:r>
-              <a:rPr lang="es-AR" baseline="0" dirty="0" smtClean="0"/>
-              <a:t>Para las ganancias se ha tenido en cuenta la descarga de aplicación a 1 dólar (para la versión paga) y las ganancias por </a:t>
+            <a:endParaRPr lang="es-AR" baseline="0" dirty="0" smtClean="0"/>
+          </a:p>
+          <a:p>
+            <a:r>
+              <a:rPr lang="es-AR" baseline="0" dirty="0" smtClean="0"/>
+              <a:t>En </a:t>
+            </a:r>
+            <a:r>
+              <a:rPr lang="es-AR" baseline="0" dirty="0" smtClean="0"/>
+              <a:t>este gráfico se puede ver como la aplicación crecería fuertemente hasta el mes 11, llegando a los 100mil usuarios y finalmente iría disminuyendo su crecimiento a partir de ahí hasta estancarse en 160mil usuarios. </a:t>
+            </a:r>
+          </a:p>
+          <a:p>
+            <a:r>
+              <a:rPr lang="es-AR" baseline="0" dirty="0" smtClean="0"/>
+              <a:t>En lo referente </a:t>
+            </a:r>
+            <a:r>
+              <a:rPr lang="es-AR" baseline="0" dirty="0" smtClean="0"/>
+              <a:t>la </a:t>
             </a:r>
             <a:r>
               <a:rPr lang="es-AR" baseline="0" dirty="0" err="1" smtClean="0"/>
-              <a:t>google</a:t>
-            </a:r>
-            <a:r>
-              <a:rPr lang="es-AR" baseline="0" dirty="0" smtClean="0"/>
-              <a:t> </a:t>
-            </a:r>
-            <a:r>
-              <a:rPr lang="es-AR" baseline="0" dirty="0" err="1" smtClean="0"/>
-              <a:t>Adds</a:t>
-            </a:r>
-            <a:r>
-              <a:rPr lang="es-AR" baseline="0" dirty="0" smtClean="0"/>
-              <a:t> en base a la cantidad de vistas y </a:t>
-            </a:r>
-            <a:r>
-              <a:rPr lang="es-AR" baseline="0" dirty="0" err="1" smtClean="0"/>
-              <a:t>clicks</a:t>
-            </a:r>
-            <a:r>
-              <a:rPr lang="es-AR" baseline="0" dirty="0" smtClean="0"/>
-              <a:t>. Para esto último se ha considerado los valores más bajos del mercado, es decir, tan solo 15 (15-30)  centavos por </a:t>
-            </a:r>
-            <a:r>
-              <a:rPr lang="es-AR" baseline="0" dirty="0" err="1" smtClean="0"/>
-              <a:t>clicks</a:t>
-            </a:r>
-            <a:r>
-              <a:rPr lang="es-AR" baseline="0" dirty="0" smtClean="0"/>
-              <a:t>, una probabilidad de </a:t>
-            </a:r>
-            <a:r>
-              <a:rPr lang="es-AR" baseline="0" dirty="0" err="1" smtClean="0"/>
-              <a:t>click</a:t>
-            </a:r>
-            <a:r>
-              <a:rPr lang="es-AR" baseline="0" dirty="0" smtClean="0"/>
-              <a:t> de 1,5% (1,5%-2,5%)  y 10 centavo por cada mil vistas.</a:t>
-            </a:r>
-          </a:p>
-          <a:p>
-            <a:r>
-              <a:rPr lang="es-AR" baseline="0" dirty="0" smtClean="0"/>
-              <a:t>En este gráfico se puede ver como la aplicación crecería fuertemente hasta el mes 11, llegando a los 100mil usuarios y finalmente iría disminuyendo su crecimiento a partir de ahí hasta estancarse en 160mil usuarios. </a:t>
-            </a:r>
-          </a:p>
-          <a:p>
-            <a:r>
-              <a:rPr lang="es-AR" baseline="0" dirty="0" smtClean="0"/>
-              <a:t>En lo referente a las ganancias, las mismas acompañan el crecimiento de la cantidad de usuarios, teniendo en el caso de la versión paga un crecimiento mas pronunciado mientras la aplicación este en plena expansión (casi 7k </a:t>
+              <a:t>variacion</a:t>
+            </a:r>
+            <a:r>
+              <a:rPr lang="es-AR" baseline="0" dirty="0" smtClean="0"/>
+              <a:t> de los ingresos, los </a:t>
+            </a:r>
+            <a:r>
+              <a:rPr lang="es-AR" baseline="0" dirty="0" smtClean="0"/>
+              <a:t>mismas acompañan el crecimiento de la cantidad de usuarios, teniendo en el caso de la versión paga un crecimiento mas pronunciado mientras la aplicación este en plena expansión (casi 7k </a:t>
             </a:r>
             <a:r>
               <a:rPr lang="es-AR" baseline="0" dirty="0" err="1" smtClean="0"/>
@@ -4834,8 +4987,19 @@
           <a:p>
             <a:r>
               <a:rPr lang="es-AR" baseline="0" dirty="0" smtClean="0"/>
-              <a:t>Teniendo en cuenta que el gasto para mantener la aplicación son casi mínimos (tan solo un servidor) , casi todo sería ganancias.</a:t>
-            </a:r>
+              <a:t>Los gastos para mantener la aplicación son entre el 19-21%, de acuerdo al escenario y otras variables. Para calcular los gastos, hemos tenido supuesto que almacenaremos la información en la nube y hemos calculado los precios basado en esto. Se han sumado el valor de almacenamiento, </a:t>
+            </a:r>
+            <a:r>
+              <a:rPr lang="es-AR" baseline="0" dirty="0" err="1" smtClean="0"/>
+              <a:t>asi</a:t>
+            </a:r>
+            <a:r>
+              <a:rPr lang="es-AR" baseline="0" dirty="0" smtClean="0"/>
+              <a:t> como de transferencia de datos.</a:t>
+            </a:r>
+          </a:p>
+          <a:p>
+            <a:endParaRPr lang="es-AR" baseline="0" dirty="0" smtClean="0"/>
           </a:p>
           <a:p>
             <a:r>
@@ -4856,7 +5020,15 @@
             </a:r>
             <a:r>
               <a:rPr lang="es-AR" baseline="0" dirty="0" smtClean="0"/>
-              <a:t> en un futuro y considerando tan solo una expansión del 3%, el negocio no daría perdidas y hasta estaría brindando un margen de ganancias.</a:t>
+              <a:t> en un futuro y considerando tan solo una expansión del 3%, el negocio no daría perdidas y hasta estaría brindando un </a:t>
+            </a:r>
+            <a:r>
+              <a:rPr lang="es-AR" baseline="0" dirty="0" smtClean="0"/>
+              <a:t>margen </a:t>
+            </a:r>
+            <a:r>
+              <a:rPr lang="es-AR" baseline="0" dirty="0" smtClean="0"/>
+              <a:t>de ganancias.</a:t>
             </a:r>
           </a:p>
           <a:p>
@@ -4894,7 +5066,7 @@
     </p:spTree>
     <p:extLst>
       <p:ext uri="{BB962C8B-B14F-4D97-AF65-F5344CB8AC3E}">
-        <p14:creationId xmlns:p14="http://schemas.microsoft.com/office/powerpoint/2010/main" val="3003342862"/>
+        <p14:creationId xmlns:p14="http://schemas.microsoft.com/office/powerpoint/2010/main" xmlns="" val="3003342862"/>
       </p:ext>
     </p:extLst>
   </p:cSld>
@@ -5086,7 +5258,7 @@
             <a:fld id="{A7BD7AA0-4159-4CB0-B2DE-5811B6B83B79}" type="datetimeFigureOut">
               <a:rPr lang="es-AR" smtClean="0"/>
               <a:pPr/>
-              <a:t>04/08/2013</a:t>
+              <a:t>06/08/2013</a:t>
             </a:fld>
             <a:endParaRPr lang="es-AR"/>
           </a:p>
@@ -5138,7 +5310,7 @@
     </p:spTree>
     <p:extLst>
       <p:ext uri="{BB962C8B-B14F-4D97-AF65-F5344CB8AC3E}">
-        <p14:creationId xmlns:p14="http://schemas.microsoft.com/office/powerpoint/2010/main" val="4071340637"/>
+        <p14:creationId xmlns:p14="http://schemas.microsoft.com/office/powerpoint/2010/main" xmlns="" val="4071340637"/>
       </p:ext>
     </p:extLst>
   </p:cSld>
@@ -5258,7 +5430,7 @@
             <a:fld id="{A7BD7AA0-4159-4CB0-B2DE-5811B6B83B79}" type="datetimeFigureOut">
               <a:rPr lang="es-AR" smtClean="0"/>
               <a:pPr/>
-              <a:t>04/08/2013</a:t>
+              <a:t>06/08/2013</a:t>
             </a:fld>
             <a:endParaRPr lang="es-AR"/>
           </a:p>
@@ -5310,7 +5482,7 @@
     </p:spTree>
     <p:extLst>
       <p:ext uri="{BB962C8B-B14F-4D97-AF65-F5344CB8AC3E}">
-        <p14:creationId xmlns:p14="http://schemas.microsoft.com/office/powerpoint/2010/main" val="1409430677"/>
+        <p14:creationId xmlns:p14="http://schemas.microsoft.com/office/powerpoint/2010/main" xmlns="" val="1409430677"/>
       </p:ext>
     </p:extLst>
   </p:cSld>
@@ -5440,7 +5612,7 @@
             <a:fld id="{A7BD7AA0-4159-4CB0-B2DE-5811B6B83B79}" type="datetimeFigureOut">
               <a:rPr lang="es-AR" smtClean="0"/>
               <a:pPr/>
-              <a:t>04/08/2013</a:t>
+              <a:t>06/08/2013</a:t>
             </a:fld>
             <a:endParaRPr lang="es-AR"/>
           </a:p>
@@ -5492,7 +5664,7 @@
     </p:spTree>
     <p:extLst>
       <p:ext uri="{BB962C8B-B14F-4D97-AF65-F5344CB8AC3E}">
-        <p14:creationId xmlns:p14="http://schemas.microsoft.com/office/powerpoint/2010/main" val="162565899"/>
+        <p14:creationId xmlns:p14="http://schemas.microsoft.com/office/powerpoint/2010/main" xmlns="" val="162565899"/>
       </p:ext>
     </p:extLst>
   </p:cSld>
@@ -5612,7 +5784,7 @@
             <a:fld id="{A7BD7AA0-4159-4CB0-B2DE-5811B6B83B79}" type="datetimeFigureOut">
               <a:rPr lang="es-AR" smtClean="0"/>
               <a:pPr/>
-              <a:t>04/08/2013</a:t>
+              <a:t>06/08/2013</a:t>
             </a:fld>
             <a:endParaRPr lang="es-AR"/>
           </a:p>
@@ -5664,7 +5836,7 @@
     </p:spTree>
     <p:extLst>
       <p:ext uri="{BB962C8B-B14F-4D97-AF65-F5344CB8AC3E}">
-        <p14:creationId xmlns:p14="http://schemas.microsoft.com/office/powerpoint/2010/main" val="1601180198"/>
+        <p14:creationId xmlns:p14="http://schemas.microsoft.com/office/powerpoint/2010/main" xmlns="" val="1601180198"/>
       </p:ext>
     </p:extLst>
   </p:cSld>
@@ -5860,7 +6032,7 @@
             <a:fld id="{A7BD7AA0-4159-4CB0-B2DE-5811B6B83B79}" type="datetimeFigureOut">
               <a:rPr lang="es-AR" smtClean="0"/>
               <a:pPr/>
-              <a:t>04/08/2013</a:t>
+              <a:t>06/08/2013</a:t>
             </a:fld>
             <a:endParaRPr lang="es-AR"/>
           </a:p>
@@ -5912,7 +6084,7 @@
     </p:spTree>
     <p:extLst>
       <p:ext uri="{BB962C8B-B14F-4D97-AF65-F5344CB8AC3E}">
-        <p14:creationId xmlns:p14="http://schemas.microsoft.com/office/powerpoint/2010/main" val="472115813"/>
+        <p14:creationId xmlns:p14="http://schemas.microsoft.com/office/powerpoint/2010/main" xmlns="" val="472115813"/>
       </p:ext>
     </p:extLst>
   </p:cSld>
@@ -6150,7 +6322,7 @@
             <a:fld id="{A7BD7AA0-4159-4CB0-B2DE-5811B6B83B79}" type="datetimeFigureOut">
               <a:rPr lang="es-AR" smtClean="0"/>
               <a:pPr/>
-              <a:t>04/08/2013</a:t>
+              <a:t>06/08/2013</a:t>
             </a:fld>
             <a:endParaRPr lang="es-AR"/>
           </a:p>
@@ -6202,7 +6374,7 @@
     </p:spTree>
     <p:extLst>
       <p:ext uri="{BB962C8B-B14F-4D97-AF65-F5344CB8AC3E}">
-        <p14:creationId xmlns:p14="http://schemas.microsoft.com/office/powerpoint/2010/main" val="593189153"/>
+        <p14:creationId xmlns:p14="http://schemas.microsoft.com/office/powerpoint/2010/main" xmlns="" val="593189153"/>
       </p:ext>
     </p:extLst>
   </p:cSld>
@@ -6574,7 +6746,7 @@
             <a:fld id="{A7BD7AA0-4159-4CB0-B2DE-5811B6B83B79}" type="datetimeFigureOut">
               <a:rPr lang="es-AR" smtClean="0"/>
               <a:pPr/>
-              <a:t>04/08/2013</a:t>
+              <a:t>06/08/2013</a:t>
             </a:fld>
             <a:endParaRPr lang="es-AR"/>
           </a:p>
@@ -6626,7 +6798,7 @@
     </p:spTree>
     <p:extLst>
       <p:ext uri="{BB962C8B-B14F-4D97-AF65-F5344CB8AC3E}">
-        <p14:creationId xmlns:p14="http://schemas.microsoft.com/office/powerpoint/2010/main" val="4057715406"/>
+        <p14:creationId xmlns:p14="http://schemas.microsoft.com/office/powerpoint/2010/main" xmlns="" val="4057715406"/>
       </p:ext>
     </p:extLst>
   </p:cSld>
@@ -6694,7 +6866,7 @@
             <a:fld id="{A7BD7AA0-4159-4CB0-B2DE-5811B6B83B79}" type="datetimeFigureOut">
               <a:rPr lang="es-AR" smtClean="0"/>
               <a:pPr/>
-              <a:t>04/08/2013</a:t>
+              <a:t>06/08/2013</a:t>
             </a:fld>
             <a:endParaRPr lang="es-AR"/>
           </a:p>
@@ -6746,7 +6918,7 @@
     </p:spTree>
     <p:extLst>
       <p:ext uri="{BB962C8B-B14F-4D97-AF65-F5344CB8AC3E}">
-        <p14:creationId xmlns:p14="http://schemas.microsoft.com/office/powerpoint/2010/main" val="3412129552"/>
+        <p14:creationId xmlns:p14="http://schemas.microsoft.com/office/powerpoint/2010/main" xmlns="" val="3412129552"/>
       </p:ext>
     </p:extLst>
   </p:cSld>
@@ -6791,7 +6963,7 @@
             <a:fld id="{A7BD7AA0-4159-4CB0-B2DE-5811B6B83B79}" type="datetimeFigureOut">
               <a:rPr lang="es-AR" smtClean="0"/>
               <a:pPr/>
-              <a:t>04/08/2013</a:t>
+              <a:t>06/08/2013</a:t>
             </a:fld>
             <a:endParaRPr lang="es-AR"/>
           </a:p>
@@ -6843,7 +7015,7 @@
     </p:spTree>
     <p:extLst>
       <p:ext uri="{BB962C8B-B14F-4D97-AF65-F5344CB8AC3E}">
-        <p14:creationId xmlns:p14="http://schemas.microsoft.com/office/powerpoint/2010/main" val="2648432124"/>
+        <p14:creationId xmlns:p14="http://schemas.microsoft.com/office/powerpoint/2010/main" xmlns="" val="2648432124"/>
       </p:ext>
     </p:extLst>
   </p:cSld>
@@ -7070,7 +7242,7 @@
             <a:fld id="{A7BD7AA0-4159-4CB0-B2DE-5811B6B83B79}" type="datetimeFigureOut">
               <a:rPr lang="es-AR" smtClean="0"/>
               <a:pPr/>
-              <a:t>04/08/2013</a:t>
+              <a:t>06/08/2013</a:t>
             </a:fld>
             <a:endParaRPr lang="es-AR"/>
           </a:p>
@@ -7122,7 +7294,7 @@
     </p:spTree>
     <p:extLst>
       <p:ext uri="{BB962C8B-B14F-4D97-AF65-F5344CB8AC3E}">
-        <p14:creationId xmlns:p14="http://schemas.microsoft.com/office/powerpoint/2010/main" val="47927167"/>
+        <p14:creationId xmlns:p14="http://schemas.microsoft.com/office/powerpoint/2010/main" xmlns="" val="47927167"/>
       </p:ext>
     </p:extLst>
   </p:cSld>
@@ -7325,7 +7497,7 @@
             <a:fld id="{A7BD7AA0-4159-4CB0-B2DE-5811B6B83B79}" type="datetimeFigureOut">
               <a:rPr lang="es-AR" smtClean="0"/>
               <a:pPr/>
-              <a:t>04/08/2013</a:t>
+              <a:t>06/08/2013</a:t>
             </a:fld>
             <a:endParaRPr lang="es-AR"/>
           </a:p>
@@ -7377,7 +7549,7 @@
     </p:spTree>
     <p:extLst>
       <p:ext uri="{BB962C8B-B14F-4D97-AF65-F5344CB8AC3E}">
-        <p14:creationId xmlns:p14="http://schemas.microsoft.com/office/powerpoint/2010/main" val="150690754"/>
+        <p14:creationId xmlns:p14="http://schemas.microsoft.com/office/powerpoint/2010/main" xmlns="" val="150690754"/>
       </p:ext>
     </p:extLst>
   </p:cSld>
@@ -7540,7 +7712,7 @@
             <a:fld id="{A7BD7AA0-4159-4CB0-B2DE-5811B6B83B79}" type="datetimeFigureOut">
               <a:rPr lang="es-AR" smtClean="0"/>
               <a:pPr/>
-              <a:t>04/08/2013</a:t>
+              <a:t>06/08/2013</a:t>
             </a:fld>
             <a:endParaRPr lang="es-AR"/>
           </a:p>
@@ -7628,7 +7800,7 @@
     </p:spTree>
     <p:extLst>
       <p:ext uri="{BB962C8B-B14F-4D97-AF65-F5344CB8AC3E}">
-        <p14:creationId xmlns:p14="http://schemas.microsoft.com/office/powerpoint/2010/main" val="3745856367"/>
+        <p14:creationId xmlns:p14="http://schemas.microsoft.com/office/powerpoint/2010/main" xmlns="" val="3745856367"/>
       </p:ext>
     </p:extLst>
   </p:cSld>
@@ -7973,7 +8145,7 @@
     </p:spTree>
     <p:extLst>
       <p:ext uri="{BB962C8B-B14F-4D97-AF65-F5344CB8AC3E}">
-        <p14:creationId xmlns:p14="http://schemas.microsoft.com/office/powerpoint/2010/main" val="2180121556"/>
+        <p14:creationId xmlns:p14="http://schemas.microsoft.com/office/powerpoint/2010/main" xmlns="" val="2180121556"/>
       </p:ext>
     </p:extLst>
   </p:cSld>
@@ -8041,7 +8213,7 @@
           <p:nvPr>
             <p:extLst>
               <p:ext uri="{D42A27DB-BD31-4B8C-83A1-F6EECF244321}">
-                <p14:modId xmlns:p14="http://schemas.microsoft.com/office/powerpoint/2010/main" val="3151868125"/>
+                <p14:modId xmlns:p14="http://schemas.microsoft.com/office/powerpoint/2010/main" xmlns="" val="3151868125"/>
               </p:ext>
             </p:extLst>
           </p:nvPr>
@@ -8059,7 +8231,7 @@
     </p:spTree>
     <p:extLst>
       <p:ext uri="{BB962C8B-B14F-4D97-AF65-F5344CB8AC3E}">
-        <p14:creationId xmlns:p14="http://schemas.microsoft.com/office/powerpoint/2010/main" val="4186439492"/>
+        <p14:creationId xmlns:p14="http://schemas.microsoft.com/office/powerpoint/2010/main" xmlns="" val="4186439492"/>
       </p:ext>
     </p:extLst>
   </p:cSld>
@@ -8127,10 +8299,10 @@
           </p:nvPr>
         </p:nvPicPr>
         <p:blipFill>
-          <a:blip r:embed="rId3">
+          <a:blip r:embed="rId3" cstate="print">
             <a:extLst>
               <a:ext uri="{28A0092B-C50C-407E-A947-70E740481C1C}">
-                <a14:useLocalDpi xmlns:a14="http://schemas.microsoft.com/office/drawing/2010/main" val="0"/>
+                <a14:useLocalDpi xmlns:a14="http://schemas.microsoft.com/office/drawing/2010/main" xmlns="" val="0"/>
               </a:ext>
             </a:extLst>
           </a:blip>
@@ -8148,7 +8320,7 @@
     </p:spTree>
     <p:extLst>
       <p:ext uri="{BB962C8B-B14F-4D97-AF65-F5344CB8AC3E}">
-        <p14:creationId xmlns:p14="http://schemas.microsoft.com/office/powerpoint/2010/main" val="1183574876"/>
+        <p14:creationId xmlns:p14="http://schemas.microsoft.com/office/powerpoint/2010/main" xmlns="" val="1183574876"/>
       </p:ext>
     </p:extLst>
   </p:cSld>
@@ -8194,7 +8366,7 @@
           <a:blip r:embed="rId2" cstate="print">
             <a:extLst>
               <a:ext uri="{28A0092B-C50C-407E-A947-70E740481C1C}">
-                <a14:useLocalDpi xmlns:a14="http://schemas.microsoft.com/office/drawing/2010/main" val="0"/>
+                <a14:useLocalDpi xmlns:a14="http://schemas.microsoft.com/office/drawing/2010/main" xmlns="" val="0"/>
               </a:ext>
             </a:extLst>
           </a:blip>
@@ -8215,7 +8387,7 @@
     </p:spTree>
     <p:extLst>
       <p:ext uri="{BB962C8B-B14F-4D97-AF65-F5344CB8AC3E}">
-        <p14:creationId xmlns:p14="http://schemas.microsoft.com/office/powerpoint/2010/main" val="4096827736"/>
+        <p14:creationId xmlns:p14="http://schemas.microsoft.com/office/powerpoint/2010/main" xmlns="" val="4096827736"/>
       </p:ext>
     </p:extLst>
   </p:cSld>
@@ -8281,10 +8453,10 @@
           <p:nvPr/>
         </p:nvPicPr>
         <p:blipFill>
-          <a:blip r:embed="rId3">
+          <a:blip r:embed="rId3" cstate="print">
             <a:extLst>
               <a:ext uri="{28A0092B-C50C-407E-A947-70E740481C1C}">
-                <a14:useLocalDpi xmlns:a14="http://schemas.microsoft.com/office/drawing/2010/main" val="0"/>
+                <a14:useLocalDpi xmlns:a14="http://schemas.microsoft.com/office/drawing/2010/main" xmlns="" val="0"/>
               </a:ext>
             </a:extLst>
           </a:blip>
@@ -8305,7 +8477,7 @@
     </p:spTree>
     <p:extLst>
       <p:ext uri="{BB962C8B-B14F-4D97-AF65-F5344CB8AC3E}">
-        <p14:creationId xmlns:p14="http://schemas.microsoft.com/office/powerpoint/2010/main" val="3085539111"/>
+        <p14:creationId xmlns:p14="http://schemas.microsoft.com/office/powerpoint/2010/main" xmlns="" val="3085539111"/>
       </p:ext>
     </p:extLst>
   </p:cSld>
@@ -8371,10 +8543,10 @@
           <p:nvPr/>
         </p:nvPicPr>
         <p:blipFill>
-          <a:blip r:embed="rId3">
+          <a:blip r:embed="rId3" cstate="print">
             <a:extLst>
               <a:ext uri="{28A0092B-C50C-407E-A947-70E740481C1C}">
-                <a14:useLocalDpi xmlns:a14="http://schemas.microsoft.com/office/drawing/2010/main" val="0"/>
+                <a14:useLocalDpi xmlns:a14="http://schemas.microsoft.com/office/drawing/2010/main" xmlns="" val="0"/>
               </a:ext>
             </a:extLst>
           </a:blip>
@@ -8395,7 +8567,7 @@
     </p:spTree>
     <p:extLst>
       <p:ext uri="{BB962C8B-B14F-4D97-AF65-F5344CB8AC3E}">
-        <p14:creationId xmlns:p14="http://schemas.microsoft.com/office/powerpoint/2010/main" val="486420949"/>
+        <p14:creationId xmlns:p14="http://schemas.microsoft.com/office/powerpoint/2010/main" xmlns="" val="486420949"/>
       </p:ext>
     </p:extLst>
   </p:cSld>
@@ -8463,10 +8635,10 @@
           </p:nvPr>
         </p:nvPicPr>
         <p:blipFill>
-          <a:blip r:embed="rId3">
+          <a:blip r:embed="rId3" cstate="print">
             <a:extLst>
               <a:ext uri="{28A0092B-C50C-407E-A947-70E740481C1C}">
-                <a14:useLocalDpi xmlns:a14="http://schemas.microsoft.com/office/drawing/2010/main" val="0"/>
+                <a14:useLocalDpi xmlns:a14="http://schemas.microsoft.com/office/drawing/2010/main" xmlns="" val="0"/>
               </a:ext>
             </a:extLst>
           </a:blip>
@@ -8484,7 +8656,7 @@
     </p:spTree>
     <p:extLst>
       <p:ext uri="{BB962C8B-B14F-4D97-AF65-F5344CB8AC3E}">
-        <p14:creationId xmlns:p14="http://schemas.microsoft.com/office/powerpoint/2010/main" val="748539481"/>
+        <p14:creationId xmlns:p14="http://schemas.microsoft.com/office/powerpoint/2010/main" xmlns="" val="748539481"/>
       </p:ext>
     </p:extLst>
   </p:cSld>
@@ -8550,10 +8722,10 @@
           <p:nvPr/>
         </p:nvPicPr>
         <p:blipFill>
-          <a:blip r:embed="rId3">
+          <a:blip r:embed="rId3" cstate="print">
             <a:extLst>
               <a:ext uri="{28A0092B-C50C-407E-A947-70E740481C1C}">
-                <a14:useLocalDpi xmlns:a14="http://schemas.microsoft.com/office/drawing/2010/main" val="0"/>
+                <a14:useLocalDpi xmlns:a14="http://schemas.microsoft.com/office/drawing/2010/main" xmlns="" val="0"/>
               </a:ext>
             </a:extLst>
           </a:blip>
@@ -8574,7 +8746,7 @@
     </p:spTree>
     <p:extLst>
       <p:ext uri="{BB962C8B-B14F-4D97-AF65-F5344CB8AC3E}">
-        <p14:creationId xmlns:p14="http://schemas.microsoft.com/office/powerpoint/2010/main" val="2245358919"/>
+        <p14:creationId xmlns:p14="http://schemas.microsoft.com/office/powerpoint/2010/main" xmlns="" val="2245358919"/>
       </p:ext>
     </p:extLst>
   </p:cSld>
@@ -8645,7 +8817,7 @@
             <p:ph idx="1"/>
             <p:extLst>
               <p:ext uri="{D42A27DB-BD31-4B8C-83A1-F6EECF244321}">
-                <p14:modId xmlns:p14="http://schemas.microsoft.com/office/powerpoint/2010/main" val="4149895999"/>
+                <p14:modId xmlns:p14="http://schemas.microsoft.com/office/powerpoint/2010/main" xmlns="" val="4149895999"/>
               </p:ext>
             </p:extLst>
           </p:nvPr>
@@ -9244,7 +9416,7 @@
     </p:spTree>
     <p:extLst>
       <p:ext uri="{BB962C8B-B14F-4D97-AF65-F5344CB8AC3E}">
-        <p14:creationId xmlns:p14="http://schemas.microsoft.com/office/powerpoint/2010/main" val="1434869260"/>
+        <p14:creationId xmlns:p14="http://schemas.microsoft.com/office/powerpoint/2010/main" xmlns="" val="1434869260"/>
       </p:ext>
     </p:extLst>
   </p:cSld>
@@ -9282,10 +9454,10 @@
           </p:nvPr>
         </p:nvPicPr>
         <p:blipFill>
-          <a:blip r:embed="rId3">
+          <a:blip r:embed="rId3" cstate="print">
             <a:extLst>
               <a:ext uri="{28A0092B-C50C-407E-A947-70E740481C1C}">
-                <a14:useLocalDpi xmlns:a14="http://schemas.microsoft.com/office/drawing/2010/main" val="0"/>
+                <a14:useLocalDpi xmlns:a14="http://schemas.microsoft.com/office/drawing/2010/main" xmlns="" val="0"/>
               </a:ext>
             </a:extLst>
           </a:blip>
@@ -9305,7 +9477,7 @@
           <a:noFill/>
           <a:extLst>
             <a:ext uri="{909E8E84-426E-40DD-AFC4-6F175D3DCCD1}">
-              <a14:hiddenFill xmlns:a14="http://schemas.microsoft.com/office/drawing/2010/main">
+              <a14:hiddenFill xmlns:a14="http://schemas.microsoft.com/office/drawing/2010/main" xmlns="">
                 <a:solidFill>
                   <a:srgbClr val="FFFFFF"/>
                 </a:solidFill>
@@ -9348,7 +9520,7 @@
     </p:spTree>
     <p:extLst>
       <p:ext uri="{BB962C8B-B14F-4D97-AF65-F5344CB8AC3E}">
-        <p14:creationId xmlns:p14="http://schemas.microsoft.com/office/powerpoint/2010/main" val="4021245580"/>
+        <p14:creationId xmlns:p14="http://schemas.microsoft.com/office/powerpoint/2010/main" xmlns="" val="4021245580"/>
       </p:ext>
     </p:extLst>
   </p:cSld>
@@ -9419,7 +9591,7 @@
           <a:blip r:embed="rId3" cstate="print">
             <a:extLst>
               <a:ext uri="{28A0092B-C50C-407E-A947-70E740481C1C}">
-                <a14:useLocalDpi xmlns:a14="http://schemas.microsoft.com/office/drawing/2010/main" val="0"/>
+                <a14:useLocalDpi xmlns:a14="http://schemas.microsoft.com/office/drawing/2010/main" xmlns="" val="0"/>
               </a:ext>
             </a:extLst>
           </a:blip>
@@ -9514,7 +9686,7 @@
     </p:spTree>
     <p:extLst>
       <p:ext uri="{BB962C8B-B14F-4D97-AF65-F5344CB8AC3E}">
-        <p14:creationId xmlns:p14="http://schemas.microsoft.com/office/powerpoint/2010/main" val="318816464"/>
+        <p14:creationId xmlns:p14="http://schemas.microsoft.com/office/powerpoint/2010/main" xmlns="" val="318816464"/>
       </p:ext>
     </p:extLst>
   </p:cSld>
@@ -9596,7 +9768,7 @@
           <p:nvPr>
             <p:extLst>
               <p:ext uri="{D42A27DB-BD31-4B8C-83A1-F6EECF244321}">
-                <p14:modId xmlns:p14="http://schemas.microsoft.com/office/powerpoint/2010/main" val="1186373056"/>
+                <p14:modId xmlns:p14="http://schemas.microsoft.com/office/powerpoint/2010/main" xmlns="" val="1186373056"/>
               </p:ext>
             </p:extLst>
           </p:nvPr>
@@ -9614,7 +9786,7 @@
     </p:spTree>
     <p:extLst>
       <p:ext uri="{BB962C8B-B14F-4D97-AF65-F5344CB8AC3E}">
-        <p14:creationId xmlns:p14="http://schemas.microsoft.com/office/powerpoint/2010/main" val="4226239434"/>
+        <p14:creationId xmlns:p14="http://schemas.microsoft.com/office/powerpoint/2010/main" xmlns="" val="4226239434"/>
       </p:ext>
     </p:extLst>
   </p:cSld>

</xml_diff>

<commit_message>
correcion lineas de mas
</commit_message>
<xml_diff>
--- a/Assets/Presentación negocio.pptx
+++ b/Assets/Presentación negocio.pptx
@@ -2975,7 +2975,7 @@
         <p:spPr/>
         <p:txBody>
           <a:bodyPr>
-            <a:normAutofit lnSpcReduction="10000"/>
+            <a:normAutofit/>
           </a:bodyPr>
           <a:lstStyle/>
           <a:p>
@@ -3986,77 +3986,6 @@
           <a:p>
             <a:endParaRPr lang="es-AR" baseline="0" dirty="0" smtClean="0"/>
           </a:p>
-          <a:p>
-            <a:r>
-              <a:rPr lang="es-AR" baseline="0" dirty="0" smtClean="0"/>
-              <a:t>En </a:t>
-            </a:r>
-            <a:r>
-              <a:rPr lang="es-AR" baseline="0" dirty="0" smtClean="0"/>
-              <a:t>lo referente la </a:t>
-            </a:r>
-            <a:r>
-              <a:rPr lang="es-AR" baseline="0" dirty="0" err="1" smtClean="0"/>
-              <a:t>variacion</a:t>
-            </a:r>
-            <a:r>
-              <a:rPr lang="es-AR" baseline="0" dirty="0" smtClean="0"/>
-              <a:t> de los ingresos, los mismas acompañan el crecimiento de la cantidad de usuarios, teniendo en el caso de la versión paga un crecimiento mas pronunciado mientras la aplicación este en plena expansión (casi 7k </a:t>
-            </a:r>
-            <a:r>
-              <a:rPr lang="es-AR" baseline="0" dirty="0" err="1" smtClean="0"/>
-              <a:t>dolares</a:t>
-            </a:r>
-            <a:r>
-              <a:rPr lang="es-AR" baseline="0" dirty="0" smtClean="0"/>
-              <a:t>). Finalmente ambos escenarios se estabilizarían luego de dos años entre 5800 y 7000</a:t>
-            </a:r>
-          </a:p>
-          <a:p>
-            <a:r>
-              <a:rPr lang="es-AR" baseline="0" dirty="0" smtClean="0"/>
-              <a:t>Los gastos para mantener la aplicación son entre el 19-21%, de acuerdo al escenario y otras variables. Para calcular los gastos, hemos tenido supuesto que almacenaremos la información en la nube y hemos calculado los precios basado en esto. Se han sumado el valor de almacenamiento, </a:t>
-            </a:r>
-            <a:r>
-              <a:rPr lang="es-AR" baseline="0" dirty="0" err="1" smtClean="0"/>
-              <a:t>asi</a:t>
-            </a:r>
-            <a:r>
-              <a:rPr lang="es-AR" baseline="0" dirty="0" smtClean="0"/>
-              <a:t> como de transferencia de datos. Sobre estos puntos se entrará mas en detalle en la explicación técnica.</a:t>
-            </a:r>
-          </a:p>
-          <a:p>
-            <a:endParaRPr lang="es-AR" baseline="0" dirty="0" smtClean="0"/>
-          </a:p>
-          <a:p>
-            <a:r>
-              <a:rPr lang="es-AR" baseline="0" dirty="0" smtClean="0"/>
-              <a:t>Finalmente se puede concluir, que siendo este el peor escenario posible, teniendo en cuenta los precios mas bajos del mercado en lo referente a publicidad, sin considerar la </a:t>
-            </a:r>
-            <a:r>
-              <a:rPr lang="es-AR" baseline="0" dirty="0" err="1" smtClean="0"/>
-              <a:t>expansion</a:t>
-            </a:r>
-            <a:r>
-              <a:rPr lang="es-AR" baseline="0" dirty="0" smtClean="0"/>
-              <a:t> del mercado de </a:t>
-            </a:r>
-            <a:r>
-              <a:rPr lang="es-AR" baseline="0" dirty="0" err="1" smtClean="0"/>
-              <a:t>smartphones</a:t>
-            </a:r>
-            <a:r>
-              <a:rPr lang="es-AR" baseline="0" dirty="0" smtClean="0"/>
-              <a:t> en un futuro y considerando tan solo una expansión del 3%, el negocio no daría perdidas y hasta estaría brindando un margen de ganancias.</a:t>
-            </a:r>
-          </a:p>
-          <a:p>
-            <a:r>
-              <a:rPr lang="es-AR" baseline="0" dirty="0" smtClean="0"/>
-              <a:t>Sin embargo, ahora nos podríamos preguntar, y si la aplicación es realmente un éxito y se expande a otros mercados con una captación mayor?</a:t>
-            </a:r>
-          </a:p>
         </p:txBody>
       </p:sp>
       <p:sp>
@@ -5404,10 +5333,10 @@
               <a:t>Muchas gracias por su </a:t>
             </a:r>
             <a:r>
-              <a:rPr lang="es-AR" baseline="0" smtClean="0"/>
+              <a:rPr lang="es-AR" baseline="0" dirty="0" err="1" smtClean="0"/>
               <a:t>atencion</a:t>
             </a:r>
-            <a:endParaRPr lang="es-AR"/>
+            <a:endParaRPr lang="es-AR" dirty="0"/>
           </a:p>
         </p:txBody>
       </p:sp>
@@ -6977,7 +6906,7 @@
         <p:spPr/>
         <p:txBody>
           <a:bodyPr>
-            <a:normAutofit lnSpcReduction="10000"/>
+            <a:normAutofit fontScale="92500"/>
           </a:bodyPr>
           <a:lstStyle/>
           <a:p>

</xml_diff>